<commit_message>
Lots of refinements to the examples to make them more comprehensible. Also fixed a lot of bugs in the progress monitor visualization code
</commit_message>
<xml_diff>
--- a/Resources/Documentation/UML+DomainModels.pptx
+++ b/Resources/Documentation/UML+DomainModels.pptx
@@ -296,7 +296,7 @@
             <a:fld id="{1D8BD707-D9CF-40AE-B4C6-C98DA3205C09}" type="datetimeFigureOut">
               <a:rPr lang="en-US" smtClean="0"/>
               <a:pPr/>
-              <a:t>2/2/2013</a:t>
+              <a:t>2/7/2013</a:t>
             </a:fld>
             <a:endParaRPr lang="en-US"/>
           </a:p>
@@ -463,7 +463,7 @@
             <a:fld id="{1D8BD707-D9CF-40AE-B4C6-C98DA3205C09}" type="datetimeFigureOut">
               <a:rPr lang="en-US" smtClean="0"/>
               <a:pPr/>
-              <a:t>2/2/2013</a:t>
+              <a:t>2/7/2013</a:t>
             </a:fld>
             <a:endParaRPr lang="en-US"/>
           </a:p>
@@ -640,7 +640,7 @@
             <a:fld id="{1D8BD707-D9CF-40AE-B4C6-C98DA3205C09}" type="datetimeFigureOut">
               <a:rPr lang="en-US" smtClean="0"/>
               <a:pPr/>
-              <a:t>2/2/2013</a:t>
+              <a:t>2/7/2013</a:t>
             </a:fld>
             <a:endParaRPr lang="en-US"/>
           </a:p>
@@ -807,7 +807,7 @@
             <a:fld id="{1D8BD707-D9CF-40AE-B4C6-C98DA3205C09}" type="datetimeFigureOut">
               <a:rPr lang="en-US" smtClean="0"/>
               <a:pPr/>
-              <a:t>2/2/2013</a:t>
+              <a:t>2/7/2013</a:t>
             </a:fld>
             <a:endParaRPr lang="en-US"/>
           </a:p>
@@ -1050,7 +1050,7 @@
             <a:fld id="{1D8BD707-D9CF-40AE-B4C6-C98DA3205C09}" type="datetimeFigureOut">
               <a:rPr lang="en-US" smtClean="0"/>
               <a:pPr/>
-              <a:t>2/2/2013</a:t>
+              <a:t>2/7/2013</a:t>
             </a:fld>
             <a:endParaRPr lang="en-US"/>
           </a:p>
@@ -1335,7 +1335,7 @@
             <a:fld id="{1D8BD707-D9CF-40AE-B4C6-C98DA3205C09}" type="datetimeFigureOut">
               <a:rPr lang="en-US" smtClean="0"/>
               <a:pPr/>
-              <a:t>2/2/2013</a:t>
+              <a:t>2/7/2013</a:t>
             </a:fld>
             <a:endParaRPr lang="en-US"/>
           </a:p>
@@ -1754,7 +1754,7 @@
             <a:fld id="{1D8BD707-D9CF-40AE-B4C6-C98DA3205C09}" type="datetimeFigureOut">
               <a:rPr lang="en-US" smtClean="0"/>
               <a:pPr/>
-              <a:t>2/2/2013</a:t>
+              <a:t>2/7/2013</a:t>
             </a:fld>
             <a:endParaRPr lang="en-US"/>
           </a:p>
@@ -1869,7 +1869,7 @@
             <a:fld id="{1D8BD707-D9CF-40AE-B4C6-C98DA3205C09}" type="datetimeFigureOut">
               <a:rPr lang="en-US" smtClean="0"/>
               <a:pPr/>
-              <a:t>2/2/2013</a:t>
+              <a:t>2/7/2013</a:t>
             </a:fld>
             <a:endParaRPr lang="en-US"/>
           </a:p>
@@ -1961,7 +1961,7 @@
             <a:fld id="{1D8BD707-D9CF-40AE-B4C6-C98DA3205C09}" type="datetimeFigureOut">
               <a:rPr lang="en-US" smtClean="0"/>
               <a:pPr/>
-              <a:t>2/2/2013</a:t>
+              <a:t>2/7/2013</a:t>
             </a:fld>
             <a:endParaRPr lang="en-US"/>
           </a:p>
@@ -2235,7 +2235,7 @@
             <a:fld id="{1D8BD707-D9CF-40AE-B4C6-C98DA3205C09}" type="datetimeFigureOut">
               <a:rPr lang="en-US" smtClean="0"/>
               <a:pPr/>
-              <a:t>2/2/2013</a:t>
+              <a:t>2/7/2013</a:t>
             </a:fld>
             <a:endParaRPr lang="en-US"/>
           </a:p>
@@ -2485,7 +2485,7 @@
             <a:fld id="{1D8BD707-D9CF-40AE-B4C6-C98DA3205C09}" type="datetimeFigureOut">
               <a:rPr lang="en-US" smtClean="0"/>
               <a:pPr/>
-              <a:t>2/2/2013</a:t>
+              <a:t>2/7/2013</a:t>
             </a:fld>
             <a:endParaRPr lang="en-US"/>
           </a:p>
@@ -2695,7 +2695,7 @@
             <a:fld id="{1D8BD707-D9CF-40AE-B4C6-C98DA3205C09}" type="datetimeFigureOut">
               <a:rPr lang="en-US" smtClean="0"/>
               <a:pPr/>
-              <a:t>2/2/2013</a:t>
+              <a:t>2/7/2013</a:t>
             </a:fld>
             <a:endParaRPr lang="en-US"/>
           </a:p>
@@ -3119,7 +3119,7 @@
           <a:lstStyle/>
           <a:p>
             <a:pPr algn="ctr"/>
-            <a:endParaRPr lang="en-US" dirty="0"/>
+            <a:endParaRPr lang="en-US"/>
           </a:p>
         </p:txBody>
       </p:sp>
@@ -3167,7 +3167,7 @@
           <a:lstStyle/>
           <a:p>
             <a:pPr algn="ctr"/>
-            <a:endParaRPr lang="en-US" dirty="0"/>
+            <a:endParaRPr lang="en-US"/>
           </a:p>
         </p:txBody>
       </p:sp>
@@ -3217,7 +3217,7 @@
           <a:lstStyle/>
           <a:p>
             <a:pPr algn="ctr"/>
-            <a:endParaRPr lang="en-US" dirty="0"/>
+            <a:endParaRPr lang="en-US"/>
           </a:p>
         </p:txBody>
       </p:sp>
@@ -3396,10 +3396,10 @@
           <a:lstStyle/>
           <a:p>
             <a:r>
-              <a:rPr lang="en-US" sz="1100" dirty="0" smtClean="0"/>
+              <a:rPr lang="en-US" sz="1100" smtClean="0"/>
               <a:t>HoopVisualGraphComponent</a:t>
             </a:r>
-            <a:endParaRPr lang="en-US" sz="1100" dirty="0"/>
+            <a:endParaRPr lang="en-US" sz="1100"/>
           </a:p>
         </p:txBody>
       </p:sp>
@@ -3425,10 +3425,10 @@
           <a:lstStyle/>
           <a:p>
             <a:r>
-              <a:rPr lang="en-US" sz="1100" dirty="0" smtClean="0"/>
+              <a:rPr lang="en-US" sz="1100" smtClean="0"/>
               <a:t>HoopMainFrame</a:t>
             </a:r>
-            <a:endParaRPr lang="en-US" sz="1100" dirty="0"/>
+            <a:endParaRPr lang="en-US" sz="1100"/>
           </a:p>
         </p:txBody>
       </p:sp>
@@ -3454,10 +3454,10 @@
           <a:lstStyle/>
           <a:p>
             <a:r>
-              <a:rPr lang="en-US" sz="1100" dirty="0" smtClean="0"/>
+              <a:rPr lang="en-US" sz="1100" smtClean="0"/>
               <a:t>HoopGraphEditor</a:t>
             </a:r>
-            <a:endParaRPr lang="en-US" sz="1100" dirty="0"/>
+            <a:endParaRPr lang="en-US" sz="1100"/>
           </a:p>
         </p:txBody>
       </p:sp>
@@ -3506,35 +3506,6 @@
           </a:fontRef>
         </p:style>
       </p:cxnSp>
-      <p:sp>
-        <p:nvSpPr>
-          <p:cNvPr id="73" name="Rectangle 72"/>
-          <p:cNvSpPr/>
-          <p:nvPr/>
-        </p:nvSpPr>
-        <p:spPr>
-          <a:xfrm>
-            <a:off x="152400" y="533400"/>
-            <a:ext cx="1192955" cy="261610"/>
-          </a:xfrm>
-          <a:prstGeom prst="rect">
-            <a:avLst/>
-          </a:prstGeom>
-        </p:spPr>
-        <p:txBody>
-          <a:bodyPr wrap="none">
-            <a:spAutoFit/>
-          </a:bodyPr>
-          <a:lstStyle/>
-          <a:p>
-            <a:r>
-              <a:rPr lang="en-US" sz="1100" dirty="0" smtClean="0"/>
-              <a:t>HoopGraphEditor</a:t>
-            </a:r>
-            <a:endParaRPr lang="en-US" sz="1100" dirty="0"/>
-          </a:p>
-        </p:txBody>
-      </p:sp>
     </p:spTree>
   </p:cSld>
   <p:clrMapOvr>
@@ -3613,7 +3584,7 @@
           <a:lstStyle/>
           <a:p>
             <a:pPr algn="ctr"/>
-            <a:endParaRPr lang="en-US" dirty="0"/>
+            <a:endParaRPr lang="en-US"/>
           </a:p>
         </p:txBody>
       </p:sp>
@@ -3663,7 +3634,7 @@
           <a:lstStyle/>
           <a:p>
             <a:pPr algn="ctr"/>
-            <a:endParaRPr lang="en-US" dirty="0"/>
+            <a:endParaRPr lang="en-US"/>
           </a:p>
         </p:txBody>
       </p:sp>
@@ -3689,10 +3660,10 @@
           <a:lstStyle/>
           <a:p>
             <a:r>
-              <a:rPr lang="en-US" sz="1100" dirty="0" smtClean="0"/>
+              <a:rPr lang="en-US" sz="1100" smtClean="0"/>
               <a:t>HoopEmbeddedJPanel</a:t>
             </a:r>
-            <a:endParaRPr lang="en-US" sz="1100" dirty="0"/>
+            <a:endParaRPr lang="en-US" sz="1100"/>
           </a:p>
         </p:txBody>
       </p:sp>
@@ -3718,10 +3689,10 @@
           <a:lstStyle/>
           <a:p>
             <a:r>
-              <a:rPr lang="en-US" sz="1100" dirty="0" smtClean="0"/>
+              <a:rPr lang="en-US" sz="1100" smtClean="0"/>
               <a:t>HoopBasicGraphEditor</a:t>
             </a:r>
-            <a:endParaRPr lang="en-US" sz="1100" dirty="0"/>
+            <a:endParaRPr lang="en-US" sz="1100"/>
           </a:p>
         </p:txBody>
       </p:sp>
@@ -3786,10 +3757,10 @@
           <a:lstStyle/>
           <a:p>
             <a:r>
-              <a:rPr lang="en-US" sz="1100" dirty="0" smtClean="0"/>
+              <a:rPr lang="en-US" sz="1100" smtClean="0"/>
               <a:t>HoopGraphEditor</a:t>
             </a:r>
-            <a:endParaRPr lang="en-US" sz="1100" dirty="0"/>
+            <a:endParaRPr lang="en-US" sz="1100"/>
           </a:p>
         </p:txBody>
       </p:sp>
@@ -3854,10 +3825,10 @@
           <a:lstStyle/>
           <a:p>
             <a:r>
-              <a:rPr lang="en-US" sz="1100" dirty="0" smtClean="0"/>
+              <a:rPr lang="en-US" sz="1100" smtClean="0"/>
               <a:t>HoopVisualGraphComponent</a:t>
             </a:r>
-            <a:endParaRPr lang="en-US" sz="1100" dirty="0"/>
+            <a:endParaRPr lang="en-US" sz="1100"/>
           </a:p>
         </p:txBody>
       </p:sp>
@@ -3883,10 +3854,10 @@
           <a:lstStyle/>
           <a:p>
             <a:r>
-              <a:rPr lang="en-US" sz="1100" dirty="0" smtClean="0"/>
+              <a:rPr lang="en-US" sz="1100" smtClean="0"/>
               <a:t>HoopVisualGraph</a:t>
             </a:r>
-            <a:endParaRPr lang="en-US" sz="1100" dirty="0"/>
+            <a:endParaRPr lang="en-US" sz="1100"/>
           </a:p>
         </p:txBody>
       </p:sp>
@@ -4214,10 +4185,10 @@
           <a:lstStyle/>
           <a:p>
             <a:r>
-              <a:rPr lang="en-US" sz="1100" dirty="0" smtClean="0"/>
+              <a:rPr lang="en-US" sz="1100" smtClean="0"/>
               <a:t>Given at construction time</a:t>
             </a:r>
-            <a:endParaRPr lang="en-US" sz="1100" dirty="0"/>
+            <a:endParaRPr lang="en-US" sz="1100"/>
           </a:p>
         </p:txBody>
       </p:sp>
@@ -4281,10 +4252,10 @@
           <a:lstStyle/>
           <a:p>
             <a:r>
-              <a:rPr lang="en-US" sz="1100" dirty="0" smtClean="0"/>
+              <a:rPr lang="en-US" sz="1100" smtClean="0"/>
               <a:t>Given at construction time</a:t>
             </a:r>
-            <a:endParaRPr lang="en-US" sz="1100" dirty="0"/>
+            <a:endParaRPr lang="en-US" sz="1100"/>
           </a:p>
         </p:txBody>
       </p:sp>
@@ -4310,10 +4281,10 @@
           <a:lstStyle/>
           <a:p>
             <a:r>
-              <a:rPr lang="en-US" sz="1100" i="1" u="sng" dirty="0" smtClean="0"/>
+              <a:rPr lang="en-US" sz="1100" i="1" u="sng" smtClean="0"/>
               <a:t>mxGraphComponent</a:t>
             </a:r>
-            <a:endParaRPr lang="en-US" sz="1100" i="1" u="sng" dirty="0"/>
+            <a:endParaRPr lang="en-US" sz="1100" i="1" u="sng"/>
           </a:p>
         </p:txBody>
       </p:sp>
@@ -4340,10 +4311,10 @@
           <a:lstStyle/>
           <a:p>
             <a:r>
-              <a:rPr lang="en-US" sz="1100" b="1" dirty="0" smtClean="0"/>
+              <a:rPr lang="en-US" sz="1100" b="1" smtClean="0"/>
               <a:t>extends</a:t>
             </a:r>
-            <a:endParaRPr lang="en-US" sz="1100" b="1" dirty="0"/>
+            <a:endParaRPr lang="en-US" sz="1100" b="1"/>
           </a:p>
         </p:txBody>
       </p:sp>
@@ -4369,10 +4340,10 @@
           <a:lstStyle/>
           <a:p>
             <a:r>
-              <a:rPr lang="en-US" sz="1100" i="1" u="sng" dirty="0" smtClean="0"/>
+              <a:rPr lang="en-US" sz="1100" i="1" u="sng" smtClean="0"/>
               <a:t>mxGraph</a:t>
             </a:r>
-            <a:endParaRPr lang="en-US" sz="1100" i="1" u="sng" dirty="0"/>
+            <a:endParaRPr lang="en-US" sz="1100" i="1" u="sng"/>
           </a:p>
         </p:txBody>
       </p:sp>
@@ -4399,10 +4370,10 @@
           <a:lstStyle/>
           <a:p>
             <a:r>
-              <a:rPr lang="en-US" sz="1100" b="1" dirty="0" smtClean="0"/>
+              <a:rPr lang="en-US" sz="1100" b="1" smtClean="0"/>
               <a:t>extends</a:t>
             </a:r>
-            <a:endParaRPr lang="en-US" sz="1100" b="1" dirty="0"/>
+            <a:endParaRPr lang="en-US" sz="1100" b="1"/>
           </a:p>
         </p:txBody>
       </p:sp>
@@ -4428,10 +4399,10 @@
           <a:lstStyle/>
           <a:p>
             <a:r>
-              <a:rPr lang="en-US" sz="1100" i="1" u="sng" dirty="0" err="1" smtClean="0"/>
+              <a:rPr lang="en-US" sz="1100" i="1" u="sng" err="1" smtClean="0"/>
               <a:t>JPanel</a:t>
             </a:r>
-            <a:endParaRPr lang="en-US" sz="1100" i="1" u="sng" dirty="0"/>
+            <a:endParaRPr lang="en-US" sz="1100" i="1" u="sng"/>
           </a:p>
         </p:txBody>
       </p:sp>
@@ -4496,10 +4467,10 @@
           <a:lstStyle/>
           <a:p>
             <a:r>
-              <a:rPr lang="en-US" sz="1100" dirty="0" smtClean="0"/>
+              <a:rPr lang="en-US" sz="1100" smtClean="0"/>
               <a:t>HoopNodePanel</a:t>
             </a:r>
-            <a:endParaRPr lang="en-US" sz="1100" dirty="0"/>
+            <a:endParaRPr lang="en-US" sz="1100"/>
           </a:p>
         </p:txBody>
       </p:sp>
@@ -4558,10 +4529,10 @@
           <a:lstStyle/>
           <a:p>
             <a:r>
-              <a:rPr lang="en-US" sz="1100" dirty="0" smtClean="0"/>
+              <a:rPr lang="en-US" sz="1100" smtClean="0"/>
               <a:t>HoopNodeRenderer</a:t>
             </a:r>
-            <a:endParaRPr lang="en-US" sz="1100" dirty="0"/>
+            <a:endParaRPr lang="en-US" sz="1100"/>
           </a:p>
         </p:txBody>
       </p:sp>
@@ -4626,10 +4597,10 @@
           <a:lstStyle/>
           <a:p>
             <a:r>
-              <a:rPr lang="en-US" sz="1100" dirty="0" smtClean="0"/>
+              <a:rPr lang="en-US" sz="1100" smtClean="0"/>
               <a:t>HoopJComponent</a:t>
             </a:r>
-            <a:endParaRPr lang="en-US" sz="1100" dirty="0"/>
+            <a:endParaRPr lang="en-US" sz="1100"/>
           </a:p>
         </p:txBody>
       </p:sp>
@@ -4695,10 +4666,10 @@
           <a:lstStyle/>
           <a:p>
             <a:r>
-              <a:rPr lang="en-US" sz="1100" b="1" dirty="0" smtClean="0"/>
+              <a:rPr lang="en-US" sz="1100" b="1" smtClean="0"/>
               <a:t>extends</a:t>
             </a:r>
-            <a:endParaRPr lang="en-US" sz="1100" b="1" dirty="0"/>
+            <a:endParaRPr lang="en-US" sz="1100" b="1"/>
           </a:p>
         </p:txBody>
       </p:sp>
@@ -4725,10 +4696,10 @@
           <a:lstStyle/>
           <a:p>
             <a:r>
-              <a:rPr lang="en-US" sz="1100" b="1" dirty="0" smtClean="0"/>
+              <a:rPr lang="en-US" sz="1100" b="1" smtClean="0"/>
               <a:t>extends</a:t>
             </a:r>
-            <a:endParaRPr lang="en-US" sz="1100" b="1" dirty="0"/>
+            <a:endParaRPr lang="en-US" sz="1100" b="1"/>
           </a:p>
         </p:txBody>
       </p:sp>
@@ -4755,10 +4726,10 @@
           <a:lstStyle/>
           <a:p>
             <a:r>
-              <a:rPr lang="en-US" sz="1100" b="1" dirty="0" smtClean="0"/>
+              <a:rPr lang="en-US" sz="1100" b="1" smtClean="0"/>
               <a:t>extends</a:t>
             </a:r>
-            <a:endParaRPr lang="en-US" sz="1100" b="1" dirty="0"/>
+            <a:endParaRPr lang="en-US" sz="1100" b="1"/>
           </a:p>
         </p:txBody>
       </p:sp>
@@ -4785,10 +4756,10 @@
           <a:lstStyle/>
           <a:p>
             <a:r>
-              <a:rPr lang="en-US" sz="1100" b="1" dirty="0" smtClean="0"/>
+              <a:rPr lang="en-US" sz="1100" b="1" smtClean="0"/>
               <a:t>extends</a:t>
             </a:r>
-            <a:endParaRPr lang="en-US" sz="1100" b="1" dirty="0"/>
+            <a:endParaRPr lang="en-US" sz="1100" b="1"/>
           </a:p>
         </p:txBody>
       </p:sp>
@@ -4815,10 +4786,10 @@
           <a:lstStyle/>
           <a:p>
             <a:r>
-              <a:rPr lang="en-US" sz="1100" b="1" dirty="0" smtClean="0"/>
+              <a:rPr lang="en-US" sz="1100" b="1" smtClean="0"/>
               <a:t>extends</a:t>
             </a:r>
-            <a:endParaRPr lang="en-US" sz="1100" b="1" dirty="0"/>
+            <a:endParaRPr lang="en-US" sz="1100" b="1"/>
           </a:p>
         </p:txBody>
       </p:sp>
@@ -4844,10 +4815,10 @@
           <a:lstStyle/>
           <a:p>
             <a:r>
-              <a:rPr lang="en-US" sz="1100" u="sng" dirty="0" smtClean="0"/>
+              <a:rPr lang="en-US" sz="1100" u="sng" smtClean="0"/>
               <a:t>JComponent</a:t>
             </a:r>
-            <a:endParaRPr lang="en-US" sz="1100" u="sng" dirty="0"/>
+            <a:endParaRPr lang="en-US" sz="1100" u="sng"/>
           </a:p>
         </p:txBody>
       </p:sp>
@@ -4913,10 +4884,10 @@
           <a:lstStyle/>
           <a:p>
             <a:r>
-              <a:rPr lang="en-US" sz="1100" b="1" dirty="0" smtClean="0"/>
+              <a:rPr lang="en-US" sz="1100" b="1" smtClean="0"/>
               <a:t>extends</a:t>
             </a:r>
-            <a:endParaRPr lang="en-US" sz="1100" b="1" dirty="0"/>
+            <a:endParaRPr lang="en-US" sz="1100" b="1"/>
           </a:p>
         </p:txBody>
       </p:sp>
@@ -5020,10 +4991,10 @@
           <a:lstStyle/>
           <a:p>
             <a:r>
-              <a:rPr lang="en-US" sz="1100" dirty="0" smtClean="0"/>
+              <a:rPr lang="en-US" sz="1100" smtClean="0"/>
               <a:t>HoopBase</a:t>
             </a:r>
-            <a:endParaRPr lang="en-US" sz="1100" dirty="0"/>
+            <a:endParaRPr lang="en-US" sz="1100"/>
           </a:p>
         </p:txBody>
       </p:sp>
@@ -5089,10 +5060,10 @@
           <a:lstStyle/>
           <a:p>
             <a:r>
-              <a:rPr lang="en-US" sz="1100" b="1" dirty="0" smtClean="0"/>
+              <a:rPr lang="en-US" sz="1100" b="1" smtClean="0"/>
               <a:t>uses</a:t>
             </a:r>
-            <a:endParaRPr lang="en-US" sz="1100" b="1" dirty="0"/>
+            <a:endParaRPr lang="en-US" sz="1100" b="1"/>
           </a:p>
         </p:txBody>
       </p:sp>
@@ -5142,7 +5113,7 @@
           <a:lstStyle/>
           <a:p>
             <a:pPr algn="ctr"/>
-            <a:endParaRPr lang="en-US" dirty="0"/>
+            <a:endParaRPr lang="en-US"/>
           </a:p>
         </p:txBody>
       </p:sp>
@@ -5168,10 +5139,10 @@
           <a:lstStyle/>
           <a:p>
             <a:r>
-              <a:rPr lang="en-US" sz="1100" dirty="0" smtClean="0"/>
+              <a:rPr lang="en-US" sz="1100" smtClean="0"/>
               <a:t>HoopMainFrame</a:t>
             </a:r>
-            <a:endParaRPr lang="en-US" sz="1100" dirty="0"/>
+            <a:endParaRPr lang="en-US" sz="1100"/>
           </a:p>
         </p:txBody>
       </p:sp>
@@ -5233,10 +5204,10 @@
           <a:lstStyle/>
           <a:p>
             <a:r>
-              <a:rPr lang="en-US" sz="1100" b="1" dirty="0" smtClean="0"/>
+              <a:rPr lang="en-US" sz="1100" b="1" smtClean="0"/>
               <a:t>uses</a:t>
             </a:r>
-            <a:endParaRPr lang="en-US" sz="1100" b="1" dirty="0"/>
+            <a:endParaRPr lang="en-US" sz="1100" b="1"/>
           </a:p>
         </p:txBody>
       </p:sp>
@@ -5308,10 +5279,10 @@
           <a:lstStyle/>
           <a:p>
             <a:r>
-              <a:rPr lang="en-US" sz="1100" dirty="0" smtClean="0"/>
+              <a:rPr lang="en-US" sz="1100" smtClean="0"/>
               <a:t>HoopBaseTyped</a:t>
             </a:r>
-            <a:endParaRPr lang="en-US" sz="1100" dirty="0"/>
+            <a:endParaRPr lang="en-US" sz="1100"/>
           </a:p>
         </p:txBody>
       </p:sp>
@@ -5373,10 +5344,10 @@
           <a:lstStyle/>
           <a:p>
             <a:r>
-              <a:rPr lang="en-US" sz="1100" dirty="0" smtClean="0"/>
+              <a:rPr lang="en-US" sz="1100" smtClean="0"/>
               <a:t>HoopVisual</a:t>
             </a:r>
-            <a:endParaRPr lang="en-US" sz="1100" dirty="0"/>
+            <a:endParaRPr lang="en-US" sz="1100"/>
           </a:p>
         </p:txBody>
       </p:sp>
@@ -5463,14 +5434,14 @@
           <a:lstStyle/>
           <a:p>
             <a:r>
-              <a:rPr lang="en-US" sz="1000" dirty="0" smtClean="0">
+              <a:rPr lang="en-US" sz="1000" smtClean="0">
                 <a:solidFill>
                   <a:schemeClr val="tx1"/>
                 </a:solidFill>
               </a:rPr>
               <a:t>This is a light weight object that holds any visual  information such as size and position. That way you can load lots of hoops on a cluster without loading visual information. The actual data is stored in a helper class: HoopVisualProperties</a:t>
             </a:r>
-            <a:endParaRPr lang="en-US" sz="1000" dirty="0">
+            <a:endParaRPr lang="en-US" sz="1000">
               <a:solidFill>
                 <a:schemeClr val="tx1"/>
               </a:solidFill>
@@ -5511,6 +5482,130 @@
           </a:fontRef>
         </p:style>
       </p:cxnSp>
+      <p:sp>
+        <p:nvSpPr>
+          <p:cNvPr id="60" name="Oval 59"/>
+          <p:cNvSpPr/>
+          <p:nvPr/>
+        </p:nvSpPr>
+        <p:spPr>
+          <a:xfrm>
+            <a:off x="8382000" y="2590800"/>
+            <a:ext cx="381000" cy="381000"/>
+          </a:xfrm>
+          <a:prstGeom prst="ellipse">
+            <a:avLst/>
+          </a:prstGeom>
+          <a:solidFill>
+            <a:schemeClr val="bg2">
+              <a:lumMod val="90000"/>
+            </a:schemeClr>
+          </a:solidFill>
+          <a:ln>
+            <a:solidFill>
+              <a:schemeClr val="tx1"/>
+            </a:solidFill>
+          </a:ln>
+        </p:spPr>
+        <p:style>
+          <a:lnRef idx="2">
+            <a:schemeClr val="accent1">
+              <a:shade val="50000"/>
+            </a:schemeClr>
+          </a:lnRef>
+          <a:fillRef idx="1">
+            <a:schemeClr val="accent1"/>
+          </a:fillRef>
+          <a:effectRef idx="0">
+            <a:schemeClr val="accent1"/>
+          </a:effectRef>
+          <a:fontRef idx="minor">
+            <a:schemeClr val="lt1"/>
+          </a:fontRef>
+        </p:style>
+        <p:txBody>
+          <a:bodyPr rtlCol="0" anchor="ctr"/>
+          <a:lstStyle/>
+          <a:p>
+            <a:pPr algn="ctr"/>
+            <a:r>
+              <a:rPr lang="en-US" b="1" smtClean="0">
+                <a:solidFill>
+                  <a:schemeClr val="tx1"/>
+                </a:solidFill>
+              </a:rPr>
+              <a:t>A</a:t>
+            </a:r>
+            <a:endParaRPr lang="en-US" b="1">
+              <a:solidFill>
+                <a:schemeClr val="tx1"/>
+              </a:solidFill>
+            </a:endParaRPr>
+          </a:p>
+        </p:txBody>
+      </p:sp>
+      <p:sp>
+        <p:nvSpPr>
+          <p:cNvPr id="61" name="Oval 60"/>
+          <p:cNvSpPr/>
+          <p:nvPr/>
+        </p:nvSpPr>
+        <p:spPr>
+          <a:xfrm>
+            <a:off x="1981200" y="5943600"/>
+            <a:ext cx="381000" cy="381000"/>
+          </a:xfrm>
+          <a:prstGeom prst="ellipse">
+            <a:avLst/>
+          </a:prstGeom>
+          <a:solidFill>
+            <a:schemeClr val="bg2">
+              <a:lumMod val="90000"/>
+            </a:schemeClr>
+          </a:solidFill>
+          <a:ln>
+            <a:solidFill>
+              <a:schemeClr val="tx1"/>
+            </a:solidFill>
+          </a:ln>
+        </p:spPr>
+        <p:style>
+          <a:lnRef idx="2">
+            <a:schemeClr val="accent1">
+              <a:shade val="50000"/>
+            </a:schemeClr>
+          </a:lnRef>
+          <a:fillRef idx="1">
+            <a:schemeClr val="accent1"/>
+          </a:fillRef>
+          <a:effectRef idx="0">
+            <a:schemeClr val="accent1"/>
+          </a:effectRef>
+          <a:fontRef idx="minor">
+            <a:schemeClr val="lt1"/>
+          </a:fontRef>
+        </p:style>
+        <p:txBody>
+          <a:bodyPr rtlCol="0" anchor="ctr"/>
+          <a:lstStyle/>
+          <a:p>
+            <a:pPr algn="ctr"/>
+            <a:r>
+              <a:rPr lang="en-US" b="1" smtClean="0">
+                <a:solidFill>
+                  <a:schemeClr val="tx1"/>
+                </a:solidFill>
+              </a:rPr>
+              <a:t>B</a:t>
+            </a:r>
+            <a:endParaRPr lang="en-US" b="1">
+              <a:solidFill>
+                <a:schemeClr val="tx1"/>
+              </a:solidFill>
+            </a:endParaRPr>
+          </a:p>
+        </p:txBody>
+      </p:sp>
     </p:spTree>
   </p:cSld>
   <p:clrMapOvr>
@@ -5536,6 +5631,1738 @@
           <a:chExt cx="0" cy="0"/>
         </a:xfrm>
       </p:grpSpPr>
+      <p:sp>
+        <p:nvSpPr>
+          <p:cNvPr id="2" name="Oval 1"/>
+          <p:cNvSpPr/>
+          <p:nvPr/>
+        </p:nvSpPr>
+        <p:spPr>
+          <a:xfrm>
+            <a:off x="152400" y="152400"/>
+            <a:ext cx="381000" cy="381000"/>
+          </a:xfrm>
+          <a:prstGeom prst="ellipse">
+            <a:avLst/>
+          </a:prstGeom>
+          <a:solidFill>
+            <a:schemeClr val="bg2">
+              <a:lumMod val="90000"/>
+            </a:schemeClr>
+          </a:solidFill>
+          <a:ln>
+            <a:solidFill>
+              <a:schemeClr val="tx1"/>
+            </a:solidFill>
+          </a:ln>
+        </p:spPr>
+        <p:style>
+          <a:lnRef idx="2">
+            <a:schemeClr val="accent1">
+              <a:shade val="50000"/>
+            </a:schemeClr>
+          </a:lnRef>
+          <a:fillRef idx="1">
+            <a:schemeClr val="accent1"/>
+          </a:fillRef>
+          <a:effectRef idx="0">
+            <a:schemeClr val="accent1"/>
+          </a:effectRef>
+          <a:fontRef idx="minor">
+            <a:schemeClr val="lt1"/>
+          </a:fontRef>
+        </p:style>
+        <p:txBody>
+          <a:bodyPr rtlCol="0" anchor="ctr"/>
+          <a:lstStyle/>
+          <a:p>
+            <a:pPr algn="ctr"/>
+            <a:r>
+              <a:rPr lang="en-US" b="1" smtClean="0">
+                <a:solidFill>
+                  <a:schemeClr val="tx1"/>
+                </a:solidFill>
+              </a:rPr>
+              <a:t>A</a:t>
+            </a:r>
+            <a:endParaRPr lang="en-US" b="1">
+              <a:solidFill>
+                <a:schemeClr val="tx1"/>
+              </a:solidFill>
+            </a:endParaRPr>
+          </a:p>
+        </p:txBody>
+      </p:sp>
+      <p:sp>
+        <p:nvSpPr>
+          <p:cNvPr id="3" name="Rectangle 2"/>
+          <p:cNvSpPr/>
+          <p:nvPr/>
+        </p:nvSpPr>
+        <p:spPr>
+          <a:xfrm>
+            <a:off x="4265849" y="1240795"/>
+            <a:ext cx="763351" cy="261610"/>
+          </a:xfrm>
+          <a:prstGeom prst="rect">
+            <a:avLst/>
+          </a:prstGeom>
+        </p:spPr>
+        <p:txBody>
+          <a:bodyPr wrap="none">
+            <a:spAutoFit/>
+          </a:bodyPr>
+          <a:lstStyle/>
+          <a:p>
+            <a:r>
+              <a:rPr lang="en-US" sz="1100" smtClean="0"/>
+              <a:t>HoopBase</a:t>
+            </a:r>
+            <a:endParaRPr lang="en-US" sz="1100"/>
+          </a:p>
+        </p:txBody>
+      </p:sp>
+      <p:sp>
+        <p:nvSpPr>
+          <p:cNvPr id="4" name="Rectangle 3"/>
+          <p:cNvSpPr/>
+          <p:nvPr/>
+        </p:nvSpPr>
+        <p:spPr>
+          <a:xfrm>
+            <a:off x="4114800" y="1905000"/>
+            <a:ext cx="1114408" cy="261610"/>
+          </a:xfrm>
+          <a:prstGeom prst="rect">
+            <a:avLst/>
+          </a:prstGeom>
+        </p:spPr>
+        <p:txBody>
+          <a:bodyPr wrap="none">
+            <a:spAutoFit/>
+          </a:bodyPr>
+          <a:lstStyle/>
+          <a:p>
+            <a:r>
+              <a:rPr lang="en-US" sz="1100" smtClean="0"/>
+              <a:t>HoopBaseTyped</a:t>
+            </a:r>
+            <a:endParaRPr lang="en-US" sz="1100"/>
+          </a:p>
+        </p:txBody>
+      </p:sp>
+      <p:cxnSp>
+        <p:nvCxnSpPr>
+          <p:cNvPr id="5" name="Straight Arrow Connector 4"/>
+          <p:cNvCxnSpPr>
+            <a:stCxn id="4" idx="0"/>
+            <a:endCxn id="3" idx="2"/>
+          </p:cNvCxnSpPr>
+          <p:nvPr/>
+        </p:nvCxnSpPr>
+        <p:spPr>
+          <a:xfrm flipH="1" flipV="1">
+            <a:off x="4647525" y="1502405"/>
+            <a:ext cx="24479" cy="402595"/>
+          </a:xfrm>
+          <a:prstGeom prst="straightConnector1">
+            <a:avLst/>
+          </a:prstGeom>
+          <a:ln w="12700">
+            <a:solidFill>
+              <a:schemeClr val="tx1"/>
+            </a:solidFill>
+            <a:tailEnd type="triangle" w="med" len="med"/>
+          </a:ln>
+        </p:spPr>
+        <p:style>
+          <a:lnRef idx="1">
+            <a:schemeClr val="accent1"/>
+          </a:lnRef>
+          <a:fillRef idx="0">
+            <a:schemeClr val="accent1"/>
+          </a:fillRef>
+          <a:effectRef idx="0">
+            <a:schemeClr val="accent1"/>
+          </a:effectRef>
+          <a:fontRef idx="minor">
+            <a:schemeClr val="tx1"/>
+          </a:fontRef>
+        </p:style>
+      </p:cxnSp>
+      <p:sp>
+        <p:nvSpPr>
+          <p:cNvPr id="6" name="Rectangle 5"/>
+          <p:cNvSpPr/>
+          <p:nvPr/>
+        </p:nvSpPr>
+        <p:spPr>
+          <a:xfrm>
+            <a:off x="4267200" y="2612395"/>
+            <a:ext cx="836849" cy="261610"/>
+          </a:xfrm>
+          <a:prstGeom prst="rect">
+            <a:avLst/>
+          </a:prstGeom>
+        </p:spPr>
+        <p:txBody>
+          <a:bodyPr wrap="square">
+            <a:spAutoFit/>
+          </a:bodyPr>
+          <a:lstStyle/>
+          <a:p>
+            <a:r>
+              <a:rPr lang="en-US" sz="1100" smtClean="0"/>
+              <a:t>HoopVisual</a:t>
+            </a:r>
+            <a:endParaRPr lang="en-US" sz="1100"/>
+          </a:p>
+        </p:txBody>
+      </p:sp>
+      <p:cxnSp>
+        <p:nvCxnSpPr>
+          <p:cNvPr id="7" name="Straight Arrow Connector 6"/>
+          <p:cNvCxnSpPr>
+            <a:stCxn id="6" idx="0"/>
+            <a:endCxn id="4" idx="2"/>
+          </p:cNvCxnSpPr>
+          <p:nvPr/>
+        </p:nvCxnSpPr>
+        <p:spPr>
+          <a:xfrm flipH="1" flipV="1">
+            <a:off x="4672004" y="2166610"/>
+            <a:ext cx="13621" cy="445785"/>
+          </a:xfrm>
+          <a:prstGeom prst="straightConnector1">
+            <a:avLst/>
+          </a:prstGeom>
+          <a:ln w="12700">
+            <a:solidFill>
+              <a:schemeClr val="tx1"/>
+            </a:solidFill>
+            <a:tailEnd type="triangle" w="med" len="med"/>
+          </a:ln>
+        </p:spPr>
+        <p:style>
+          <a:lnRef idx="1">
+            <a:schemeClr val="accent1"/>
+          </a:lnRef>
+          <a:fillRef idx="0">
+            <a:schemeClr val="accent1"/>
+          </a:fillRef>
+          <a:effectRef idx="0">
+            <a:schemeClr val="accent1"/>
+          </a:effectRef>
+          <a:fontRef idx="minor">
+            <a:schemeClr val="tx1"/>
+          </a:fontRef>
+        </p:style>
+      </p:cxnSp>
+      <p:cxnSp>
+        <p:nvCxnSpPr>
+          <p:cNvPr id="8" name="Straight Connector 7"/>
+          <p:cNvCxnSpPr>
+            <a:stCxn id="9" idx="0"/>
+            <a:endCxn id="6" idx="2"/>
+          </p:cNvCxnSpPr>
+          <p:nvPr/>
+        </p:nvCxnSpPr>
+        <p:spPr>
+          <a:xfrm flipV="1">
+            <a:off x="4646849" y="2874005"/>
+            <a:ext cx="38776" cy="1109990"/>
+          </a:xfrm>
+          <a:prstGeom prst="line">
+            <a:avLst/>
+          </a:prstGeom>
+        </p:spPr>
+        <p:style>
+          <a:lnRef idx="1">
+            <a:schemeClr val="accent1"/>
+          </a:lnRef>
+          <a:fillRef idx="0">
+            <a:schemeClr val="accent1"/>
+          </a:fillRef>
+          <a:effectRef idx="0">
+            <a:schemeClr val="accent1"/>
+          </a:effectRef>
+          <a:fontRef idx="minor">
+            <a:schemeClr val="tx1"/>
+          </a:fontRef>
+        </p:style>
+      </p:cxnSp>
+      <p:sp>
+        <p:nvSpPr>
+          <p:cNvPr id="9" name="Rectangle 8"/>
+          <p:cNvSpPr/>
+          <p:nvPr/>
+        </p:nvSpPr>
+        <p:spPr>
+          <a:xfrm>
+            <a:off x="3961049" y="3983995"/>
+            <a:ext cx="1371600" cy="2286000"/>
+          </a:xfrm>
+          <a:prstGeom prst="rect">
+            <a:avLst/>
+          </a:prstGeom>
+          <a:solidFill>
+            <a:schemeClr val="bg2"/>
+          </a:solidFill>
+          <a:ln w="12700">
+            <a:solidFill>
+              <a:schemeClr val="tx1">
+                <a:lumMod val="75000"/>
+                <a:lumOff val="25000"/>
+              </a:schemeClr>
+            </a:solidFill>
+          </a:ln>
+        </p:spPr>
+        <p:style>
+          <a:lnRef idx="2">
+            <a:schemeClr val="accent1">
+              <a:shade val="50000"/>
+            </a:schemeClr>
+          </a:lnRef>
+          <a:fillRef idx="1">
+            <a:schemeClr val="accent1"/>
+          </a:fillRef>
+          <a:effectRef idx="0">
+            <a:schemeClr val="accent1"/>
+          </a:effectRef>
+          <a:fontRef idx="minor">
+            <a:schemeClr val="lt1"/>
+          </a:fontRef>
+        </p:style>
+        <p:txBody>
+          <a:bodyPr rtlCol="0" anchor="ctr"/>
+          <a:lstStyle/>
+          <a:p>
+            <a:r>
+              <a:rPr lang="en-US" sz="1000" smtClean="0">
+                <a:solidFill>
+                  <a:schemeClr val="tx1"/>
+                </a:solidFill>
+              </a:rPr>
+              <a:t>This is a light weight object that holds any visual  information such as size and position. That way you can load lots of hoops on a cluster without loading visual information. The actual data is stored in a helper class: HoopVisualProperties</a:t>
+            </a:r>
+            <a:endParaRPr lang="en-US" sz="1000">
+              <a:solidFill>
+                <a:schemeClr val="tx1"/>
+              </a:solidFill>
+            </a:endParaRPr>
+          </a:p>
+        </p:txBody>
+      </p:sp>
+      <p:sp>
+        <p:nvSpPr>
+          <p:cNvPr id="11" name="Rectangle 10"/>
+          <p:cNvSpPr/>
+          <p:nvPr/>
+        </p:nvSpPr>
+        <p:spPr>
+          <a:xfrm>
+            <a:off x="6628049" y="1012195"/>
+            <a:ext cx="939681" cy="261610"/>
+          </a:xfrm>
+          <a:prstGeom prst="rect">
+            <a:avLst/>
+          </a:prstGeom>
+        </p:spPr>
+        <p:txBody>
+          <a:bodyPr wrap="none">
+            <a:spAutoFit/>
+          </a:bodyPr>
+          <a:lstStyle/>
+          <a:p>
+            <a:r>
+              <a:rPr lang="en-US" sz="1100" err="1" smtClean="0"/>
+              <a:t>HoopAnalyze</a:t>
+            </a:r>
+            <a:endParaRPr lang="en-US" sz="1100"/>
+          </a:p>
+        </p:txBody>
+      </p:sp>
+      <p:sp>
+        <p:nvSpPr>
+          <p:cNvPr id="12" name="Rectangle 11"/>
+          <p:cNvSpPr/>
+          <p:nvPr/>
+        </p:nvSpPr>
+        <p:spPr>
+          <a:xfrm>
+            <a:off x="6628049" y="1850395"/>
+            <a:ext cx="1188146" cy="261610"/>
+          </a:xfrm>
+          <a:prstGeom prst="rect">
+            <a:avLst/>
+          </a:prstGeom>
+        </p:spPr>
+        <p:txBody>
+          <a:bodyPr wrap="none">
+            <a:spAutoFit/>
+          </a:bodyPr>
+          <a:lstStyle/>
+          <a:p>
+            <a:r>
+              <a:rPr lang="en-US" sz="1100" err="1" smtClean="0"/>
+              <a:t>HoopControlBase</a:t>
+            </a:r>
+            <a:endParaRPr lang="en-US" sz="1100"/>
+          </a:p>
+        </p:txBody>
+      </p:sp>
+      <p:cxnSp>
+        <p:nvCxnSpPr>
+          <p:cNvPr id="20" name="Straight Arrow Connector 19"/>
+          <p:cNvCxnSpPr>
+            <a:stCxn id="3" idx="3"/>
+            <a:endCxn id="11" idx="1"/>
+          </p:cNvCxnSpPr>
+          <p:nvPr/>
+        </p:nvCxnSpPr>
+        <p:spPr>
+          <a:xfrm flipV="1">
+            <a:off x="5029200" y="1143000"/>
+            <a:ext cx="1598849" cy="228600"/>
+          </a:xfrm>
+          <a:prstGeom prst="straightConnector1">
+            <a:avLst/>
+          </a:prstGeom>
+          <a:ln w="12700">
+            <a:solidFill>
+              <a:schemeClr val="tx1"/>
+            </a:solidFill>
+            <a:tailEnd type="triangle" w="med" len="med"/>
+          </a:ln>
+        </p:spPr>
+        <p:style>
+          <a:lnRef idx="1">
+            <a:schemeClr val="accent1"/>
+          </a:lnRef>
+          <a:fillRef idx="0">
+            <a:schemeClr val="accent1"/>
+          </a:fillRef>
+          <a:effectRef idx="0">
+            <a:schemeClr val="accent1"/>
+          </a:effectRef>
+          <a:fontRef idx="minor">
+            <a:schemeClr val="tx1"/>
+          </a:fontRef>
+        </p:style>
+      </p:cxnSp>
+      <p:cxnSp>
+        <p:nvCxnSpPr>
+          <p:cNvPr id="23" name="Straight Arrow Connector 22"/>
+          <p:cNvCxnSpPr>
+            <a:stCxn id="3" idx="3"/>
+            <a:endCxn id="12" idx="1"/>
+          </p:cNvCxnSpPr>
+          <p:nvPr/>
+        </p:nvCxnSpPr>
+        <p:spPr>
+          <a:xfrm>
+            <a:off x="5029200" y="1371600"/>
+            <a:ext cx="1598849" cy="609600"/>
+          </a:xfrm>
+          <a:prstGeom prst="straightConnector1">
+            <a:avLst/>
+          </a:prstGeom>
+          <a:ln w="12700">
+            <a:solidFill>
+              <a:schemeClr val="tx1"/>
+            </a:solidFill>
+            <a:tailEnd type="triangle" w="med" len="med"/>
+          </a:ln>
+        </p:spPr>
+        <p:style>
+          <a:lnRef idx="1">
+            <a:schemeClr val="accent1"/>
+          </a:lnRef>
+          <a:fillRef idx="0">
+            <a:schemeClr val="accent1"/>
+          </a:fillRef>
+          <a:effectRef idx="0">
+            <a:schemeClr val="accent1"/>
+          </a:effectRef>
+          <a:fontRef idx="minor">
+            <a:schemeClr val="tx1"/>
+          </a:fontRef>
+        </p:style>
+      </p:cxnSp>
+      <p:sp>
+        <p:nvSpPr>
+          <p:cNvPr id="27" name="Rectangle 26"/>
+          <p:cNvSpPr/>
+          <p:nvPr/>
+        </p:nvSpPr>
+        <p:spPr>
+          <a:xfrm>
+            <a:off x="6628049" y="2612395"/>
+            <a:ext cx="1173719" cy="261610"/>
+          </a:xfrm>
+          <a:prstGeom prst="rect">
+            <a:avLst/>
+          </a:prstGeom>
+        </p:spPr>
+        <p:txBody>
+          <a:bodyPr wrap="none">
+            <a:spAutoFit/>
+          </a:bodyPr>
+          <a:lstStyle/>
+          <a:p>
+            <a:r>
+              <a:rPr lang="en-US" sz="1100" err="1" smtClean="0"/>
+              <a:t>HoopDisplayBase</a:t>
+            </a:r>
+            <a:endParaRPr lang="en-US" sz="1100"/>
+          </a:p>
+        </p:txBody>
+      </p:sp>
+      <p:sp>
+        <p:nvSpPr>
+          <p:cNvPr id="28" name="Rectangle 27"/>
+          <p:cNvSpPr/>
+          <p:nvPr/>
+        </p:nvSpPr>
+        <p:spPr>
+          <a:xfrm>
+            <a:off x="8075849" y="2993395"/>
+            <a:ext cx="1037463" cy="261610"/>
+          </a:xfrm>
+          <a:prstGeom prst="rect">
+            <a:avLst/>
+          </a:prstGeom>
+        </p:spPr>
+        <p:txBody>
+          <a:bodyPr wrap="none">
+            <a:spAutoFit/>
+          </a:bodyPr>
+          <a:lstStyle/>
+          <a:p>
+            <a:r>
+              <a:rPr lang="en-US" sz="1100" err="1" smtClean="0"/>
+              <a:t>HoopLoadBase</a:t>
+            </a:r>
+            <a:endParaRPr lang="en-US" sz="1100"/>
+          </a:p>
+        </p:txBody>
+      </p:sp>
+      <p:sp>
+        <p:nvSpPr>
+          <p:cNvPr id="29" name="Rectangle 28"/>
+          <p:cNvSpPr/>
+          <p:nvPr/>
+        </p:nvSpPr>
+        <p:spPr>
+          <a:xfrm>
+            <a:off x="6650858" y="3298195"/>
+            <a:ext cx="891591" cy="261610"/>
+          </a:xfrm>
+          <a:prstGeom prst="rect">
+            <a:avLst/>
+          </a:prstGeom>
+        </p:spPr>
+        <p:txBody>
+          <a:bodyPr wrap="none">
+            <a:spAutoFit/>
+          </a:bodyPr>
+          <a:lstStyle/>
+          <a:p>
+            <a:r>
+              <a:rPr lang="en-US" sz="1100" err="1" smtClean="0"/>
+              <a:t>HoopIOBase</a:t>
+            </a:r>
+            <a:endParaRPr lang="en-US" sz="1100"/>
+          </a:p>
+        </p:txBody>
+      </p:sp>
+      <p:sp>
+        <p:nvSpPr>
+          <p:cNvPr id="30" name="Rectangle 29"/>
+          <p:cNvSpPr/>
+          <p:nvPr/>
+        </p:nvSpPr>
+        <p:spPr>
+          <a:xfrm>
+            <a:off x="8075849" y="3755395"/>
+            <a:ext cx="1029449" cy="261610"/>
+          </a:xfrm>
+          <a:prstGeom prst="rect">
+            <a:avLst/>
+          </a:prstGeom>
+        </p:spPr>
+        <p:txBody>
+          <a:bodyPr wrap="none">
+            <a:spAutoFit/>
+          </a:bodyPr>
+          <a:lstStyle/>
+          <a:p>
+            <a:r>
+              <a:rPr lang="en-US" sz="1100" smtClean="0"/>
+              <a:t>HoopSaveBase</a:t>
+            </a:r>
+            <a:endParaRPr lang="en-US" sz="1100"/>
+          </a:p>
+        </p:txBody>
+      </p:sp>
+      <p:cxnSp>
+        <p:nvCxnSpPr>
+          <p:cNvPr id="32" name="Straight Arrow Connector 31"/>
+          <p:cNvCxnSpPr>
+            <a:stCxn id="29" idx="3"/>
+            <a:endCxn id="28" idx="1"/>
+          </p:cNvCxnSpPr>
+          <p:nvPr/>
+        </p:nvCxnSpPr>
+        <p:spPr>
+          <a:xfrm flipV="1">
+            <a:off x="7542449" y="3124200"/>
+            <a:ext cx="533400" cy="304800"/>
+          </a:xfrm>
+          <a:prstGeom prst="straightConnector1">
+            <a:avLst/>
+          </a:prstGeom>
+          <a:ln w="12700">
+            <a:solidFill>
+              <a:schemeClr val="tx1"/>
+            </a:solidFill>
+            <a:tailEnd type="triangle" w="med" len="med"/>
+          </a:ln>
+        </p:spPr>
+        <p:style>
+          <a:lnRef idx="1">
+            <a:schemeClr val="accent1"/>
+          </a:lnRef>
+          <a:fillRef idx="0">
+            <a:schemeClr val="accent1"/>
+          </a:fillRef>
+          <a:effectRef idx="0">
+            <a:schemeClr val="accent1"/>
+          </a:effectRef>
+          <a:fontRef idx="minor">
+            <a:schemeClr val="tx1"/>
+          </a:fontRef>
+        </p:style>
+      </p:cxnSp>
+      <p:cxnSp>
+        <p:nvCxnSpPr>
+          <p:cNvPr id="35" name="Straight Arrow Connector 34"/>
+          <p:cNvCxnSpPr>
+            <a:stCxn id="29" idx="3"/>
+            <a:endCxn id="30" idx="1"/>
+          </p:cNvCxnSpPr>
+          <p:nvPr/>
+        </p:nvCxnSpPr>
+        <p:spPr>
+          <a:xfrm>
+            <a:off x="7542449" y="3429000"/>
+            <a:ext cx="533400" cy="457200"/>
+          </a:xfrm>
+          <a:prstGeom prst="straightConnector1">
+            <a:avLst/>
+          </a:prstGeom>
+          <a:ln w="12700">
+            <a:solidFill>
+              <a:schemeClr val="tx1"/>
+            </a:solidFill>
+            <a:tailEnd type="triangle" w="med" len="med"/>
+          </a:ln>
+        </p:spPr>
+        <p:style>
+          <a:lnRef idx="1">
+            <a:schemeClr val="accent1"/>
+          </a:lnRef>
+          <a:fillRef idx="0">
+            <a:schemeClr val="accent1"/>
+          </a:fillRef>
+          <a:effectRef idx="0">
+            <a:schemeClr val="accent1"/>
+          </a:effectRef>
+          <a:fontRef idx="minor">
+            <a:schemeClr val="tx1"/>
+          </a:fontRef>
+        </p:style>
+      </p:cxnSp>
+      <p:sp>
+        <p:nvSpPr>
+          <p:cNvPr id="39" name="Rectangle 38"/>
+          <p:cNvSpPr/>
+          <p:nvPr/>
+        </p:nvSpPr>
+        <p:spPr>
+          <a:xfrm>
+            <a:off x="6643187" y="4517395"/>
+            <a:ext cx="1356462" cy="261610"/>
+          </a:xfrm>
+          <a:prstGeom prst="rect">
+            <a:avLst/>
+          </a:prstGeom>
+        </p:spPr>
+        <p:txBody>
+          <a:bodyPr wrap="none">
+            <a:spAutoFit/>
+          </a:bodyPr>
+          <a:lstStyle/>
+          <a:p>
+            <a:r>
+              <a:rPr lang="en-US" sz="1100" err="1" smtClean="0"/>
+              <a:t>HoopTransformBase</a:t>
+            </a:r>
+            <a:endParaRPr lang="en-US" sz="1100"/>
+          </a:p>
+        </p:txBody>
+      </p:sp>
+      <p:cxnSp>
+        <p:nvCxnSpPr>
+          <p:cNvPr id="41" name="Straight Arrow Connector 40"/>
+          <p:cNvCxnSpPr>
+            <a:stCxn id="3" idx="3"/>
+            <a:endCxn id="27" idx="1"/>
+          </p:cNvCxnSpPr>
+          <p:nvPr/>
+        </p:nvCxnSpPr>
+        <p:spPr>
+          <a:xfrm>
+            <a:off x="5029200" y="1371600"/>
+            <a:ext cx="1598849" cy="1371600"/>
+          </a:xfrm>
+          <a:prstGeom prst="straightConnector1">
+            <a:avLst/>
+          </a:prstGeom>
+          <a:ln w="12700">
+            <a:solidFill>
+              <a:schemeClr val="tx1"/>
+            </a:solidFill>
+            <a:tailEnd type="triangle" w="med" len="med"/>
+          </a:ln>
+        </p:spPr>
+        <p:style>
+          <a:lnRef idx="1">
+            <a:schemeClr val="accent1"/>
+          </a:lnRef>
+          <a:fillRef idx="0">
+            <a:schemeClr val="accent1"/>
+          </a:fillRef>
+          <a:effectRef idx="0">
+            <a:schemeClr val="accent1"/>
+          </a:effectRef>
+          <a:fontRef idx="minor">
+            <a:schemeClr val="tx1"/>
+          </a:fontRef>
+        </p:style>
+      </p:cxnSp>
+      <p:cxnSp>
+        <p:nvCxnSpPr>
+          <p:cNvPr id="44" name="Straight Arrow Connector 43"/>
+          <p:cNvCxnSpPr>
+            <a:stCxn id="3" idx="3"/>
+            <a:endCxn id="29" idx="1"/>
+          </p:cNvCxnSpPr>
+          <p:nvPr/>
+        </p:nvCxnSpPr>
+        <p:spPr>
+          <a:xfrm>
+            <a:off x="5029200" y="1371600"/>
+            <a:ext cx="1621658" cy="2057400"/>
+          </a:xfrm>
+          <a:prstGeom prst="straightConnector1">
+            <a:avLst/>
+          </a:prstGeom>
+          <a:ln w="12700">
+            <a:solidFill>
+              <a:schemeClr val="tx1"/>
+            </a:solidFill>
+            <a:tailEnd type="triangle" w="med" len="med"/>
+          </a:ln>
+        </p:spPr>
+        <p:style>
+          <a:lnRef idx="1">
+            <a:schemeClr val="accent1"/>
+          </a:lnRef>
+          <a:fillRef idx="0">
+            <a:schemeClr val="accent1"/>
+          </a:fillRef>
+          <a:effectRef idx="0">
+            <a:schemeClr val="accent1"/>
+          </a:effectRef>
+          <a:fontRef idx="minor">
+            <a:schemeClr val="tx1"/>
+          </a:fontRef>
+        </p:style>
+      </p:cxnSp>
+      <p:cxnSp>
+        <p:nvCxnSpPr>
+          <p:cNvPr id="47" name="Straight Arrow Connector 46"/>
+          <p:cNvCxnSpPr>
+            <a:stCxn id="3" idx="3"/>
+            <a:endCxn id="39" idx="1"/>
+          </p:cNvCxnSpPr>
+          <p:nvPr/>
+        </p:nvCxnSpPr>
+        <p:spPr>
+          <a:xfrm>
+            <a:off x="5029200" y="1371600"/>
+            <a:ext cx="1613987" cy="3276600"/>
+          </a:xfrm>
+          <a:prstGeom prst="straightConnector1">
+            <a:avLst/>
+          </a:prstGeom>
+          <a:ln w="12700">
+            <a:solidFill>
+              <a:schemeClr val="tx1"/>
+            </a:solidFill>
+            <a:tailEnd type="triangle" w="med" len="med"/>
+          </a:ln>
+        </p:spPr>
+        <p:style>
+          <a:lnRef idx="1">
+            <a:schemeClr val="accent1"/>
+          </a:lnRef>
+          <a:fillRef idx="0">
+            <a:schemeClr val="accent1"/>
+          </a:fillRef>
+          <a:effectRef idx="0">
+            <a:schemeClr val="accent1"/>
+          </a:effectRef>
+          <a:fontRef idx="minor">
+            <a:schemeClr val="tx1"/>
+          </a:fontRef>
+        </p:style>
+      </p:cxnSp>
+      <p:sp>
+        <p:nvSpPr>
+          <p:cNvPr id="69" name="Rectangle 68"/>
+          <p:cNvSpPr/>
+          <p:nvPr/>
+        </p:nvSpPr>
+        <p:spPr>
+          <a:xfrm>
+            <a:off x="1811134" y="1905000"/>
+            <a:ext cx="1465466" cy="261610"/>
+          </a:xfrm>
+          <a:prstGeom prst="rect">
+            <a:avLst/>
+          </a:prstGeom>
+        </p:spPr>
+        <p:txBody>
+          <a:bodyPr wrap="none">
+            <a:spAutoFit/>
+          </a:bodyPr>
+          <a:lstStyle/>
+          <a:p>
+            <a:r>
+              <a:rPr lang="en-US" sz="1100" smtClean="0"/>
+              <a:t>HoopStoredProperties</a:t>
+            </a:r>
+            <a:endParaRPr lang="en-US" sz="1100"/>
+          </a:p>
+        </p:txBody>
+      </p:sp>
+      <p:cxnSp>
+        <p:nvCxnSpPr>
+          <p:cNvPr id="70" name="Straight Arrow Connector 69"/>
+          <p:cNvCxnSpPr>
+            <a:endCxn id="4" idx="1"/>
+          </p:cNvCxnSpPr>
+          <p:nvPr/>
+        </p:nvCxnSpPr>
+        <p:spPr>
+          <a:xfrm>
+            <a:off x="3276600" y="2035805"/>
+            <a:ext cx="838200" cy="0"/>
+          </a:xfrm>
+          <a:prstGeom prst="straightConnector1">
+            <a:avLst/>
+          </a:prstGeom>
+          <a:ln w="12700">
+            <a:solidFill>
+              <a:schemeClr val="tx1"/>
+            </a:solidFill>
+            <a:tailEnd type="triangle" w="med" len="med"/>
+          </a:ln>
+        </p:spPr>
+        <p:style>
+          <a:lnRef idx="1">
+            <a:schemeClr val="accent1"/>
+          </a:lnRef>
+          <a:fillRef idx="0">
+            <a:schemeClr val="accent1"/>
+          </a:fillRef>
+          <a:effectRef idx="0">
+            <a:schemeClr val="accent1"/>
+          </a:effectRef>
+          <a:fontRef idx="minor">
+            <a:schemeClr val="tx1"/>
+          </a:fontRef>
+        </p:style>
+      </p:cxnSp>
+      <p:sp>
+        <p:nvSpPr>
+          <p:cNvPr id="74" name="TextBox 73"/>
+          <p:cNvSpPr txBox="1"/>
+          <p:nvPr/>
+        </p:nvSpPr>
+        <p:spPr>
+          <a:xfrm>
+            <a:off x="3352800" y="1752600"/>
+            <a:ext cx="442750" cy="261610"/>
+          </a:xfrm>
+          <a:prstGeom prst="rect">
+            <a:avLst/>
+          </a:prstGeom>
+          <a:noFill/>
+        </p:spPr>
+        <p:txBody>
+          <a:bodyPr wrap="none" rtlCol="0">
+            <a:spAutoFit/>
+          </a:bodyPr>
+          <a:lstStyle/>
+          <a:p>
+            <a:r>
+              <a:rPr lang="en-US" sz="1100" b="1" smtClean="0"/>
+              <a:t>uses</a:t>
+            </a:r>
+            <a:endParaRPr lang="en-US" sz="1100" b="1"/>
+          </a:p>
+        </p:txBody>
+      </p:sp>
+      <p:cxnSp>
+        <p:nvCxnSpPr>
+          <p:cNvPr id="76" name="Straight Connector 75"/>
+          <p:cNvCxnSpPr/>
+          <p:nvPr/>
+        </p:nvCxnSpPr>
+        <p:spPr>
+          <a:xfrm>
+            <a:off x="5943600" y="304800"/>
+            <a:ext cx="76200" cy="6324600"/>
+          </a:xfrm>
+          <a:prstGeom prst="line">
+            <a:avLst/>
+          </a:prstGeom>
+          <a:ln>
+            <a:prstDash val="dash"/>
+          </a:ln>
+        </p:spPr>
+        <p:style>
+          <a:lnRef idx="1">
+            <a:schemeClr val="accent1"/>
+          </a:lnRef>
+          <a:fillRef idx="0">
+            <a:schemeClr val="accent1"/>
+          </a:fillRef>
+          <a:effectRef idx="0">
+            <a:schemeClr val="accent1"/>
+          </a:effectRef>
+          <a:fontRef idx="minor">
+            <a:schemeClr val="tx1"/>
+          </a:fontRef>
+        </p:style>
+      </p:cxnSp>
+      <p:cxnSp>
+        <p:nvCxnSpPr>
+          <p:cNvPr id="78" name="Straight Connector 77"/>
+          <p:cNvCxnSpPr/>
+          <p:nvPr/>
+        </p:nvCxnSpPr>
+        <p:spPr>
+          <a:xfrm>
+            <a:off x="3352800" y="304800"/>
+            <a:ext cx="0" cy="6324600"/>
+          </a:xfrm>
+          <a:prstGeom prst="line">
+            <a:avLst/>
+          </a:prstGeom>
+          <a:ln>
+            <a:prstDash val="dash"/>
+          </a:ln>
+        </p:spPr>
+        <p:style>
+          <a:lnRef idx="1">
+            <a:schemeClr val="accent1"/>
+          </a:lnRef>
+          <a:fillRef idx="0">
+            <a:schemeClr val="accent1"/>
+          </a:fillRef>
+          <a:effectRef idx="0">
+            <a:schemeClr val="accent1"/>
+          </a:effectRef>
+          <a:fontRef idx="minor">
+            <a:schemeClr val="tx1"/>
+          </a:fontRef>
+        </p:style>
+      </p:cxnSp>
+      <p:sp>
+        <p:nvSpPr>
+          <p:cNvPr id="89" name="Rectangle 88"/>
+          <p:cNvSpPr/>
+          <p:nvPr/>
+        </p:nvSpPr>
+        <p:spPr>
+          <a:xfrm>
+            <a:off x="1981200" y="4343400"/>
+            <a:ext cx="1141659" cy="261610"/>
+          </a:xfrm>
+          <a:prstGeom prst="rect">
+            <a:avLst/>
+          </a:prstGeom>
+        </p:spPr>
+        <p:txBody>
+          <a:bodyPr wrap="none">
+            <a:spAutoFit/>
+          </a:bodyPr>
+          <a:lstStyle/>
+          <a:p>
+            <a:r>
+              <a:rPr lang="en-US" sz="1100" smtClean="0"/>
+              <a:t>HoopSerializable</a:t>
+            </a:r>
+            <a:endParaRPr lang="en-US" sz="1100"/>
+          </a:p>
+        </p:txBody>
+      </p:sp>
+      <p:sp>
+        <p:nvSpPr>
+          <p:cNvPr id="90" name="TextBox 89"/>
+          <p:cNvSpPr txBox="1"/>
+          <p:nvPr/>
+        </p:nvSpPr>
+        <p:spPr>
+          <a:xfrm>
+            <a:off x="2590800" y="3124200"/>
+            <a:ext cx="442750" cy="261610"/>
+          </a:xfrm>
+          <a:prstGeom prst="rect">
+            <a:avLst/>
+          </a:prstGeom>
+          <a:noFill/>
+        </p:spPr>
+        <p:txBody>
+          <a:bodyPr wrap="none" rtlCol="0">
+            <a:spAutoFit/>
+          </a:bodyPr>
+          <a:lstStyle/>
+          <a:p>
+            <a:r>
+              <a:rPr lang="en-US" sz="1100" b="1" smtClean="0"/>
+              <a:t>uses</a:t>
+            </a:r>
+            <a:endParaRPr lang="en-US" sz="1100" b="1"/>
+          </a:p>
+        </p:txBody>
+      </p:sp>
+      <p:cxnSp>
+        <p:nvCxnSpPr>
+          <p:cNvPr id="91" name="Straight Arrow Connector 90"/>
+          <p:cNvCxnSpPr>
+            <a:stCxn id="89" idx="0"/>
+            <a:endCxn id="69" idx="2"/>
+          </p:cNvCxnSpPr>
+          <p:nvPr/>
+        </p:nvCxnSpPr>
+        <p:spPr>
+          <a:xfrm flipH="1" flipV="1">
+            <a:off x="2543867" y="2166610"/>
+            <a:ext cx="8163" cy="2176790"/>
+          </a:xfrm>
+          <a:prstGeom prst="straightConnector1">
+            <a:avLst/>
+          </a:prstGeom>
+          <a:ln w="12700">
+            <a:solidFill>
+              <a:schemeClr val="tx1"/>
+            </a:solidFill>
+            <a:tailEnd type="triangle" w="med" len="med"/>
+          </a:ln>
+        </p:spPr>
+        <p:style>
+          <a:lnRef idx="1">
+            <a:schemeClr val="accent1"/>
+          </a:lnRef>
+          <a:fillRef idx="0">
+            <a:schemeClr val="accent1"/>
+          </a:fillRef>
+          <a:effectRef idx="0">
+            <a:schemeClr val="accent1"/>
+          </a:effectRef>
+          <a:fontRef idx="minor">
+            <a:schemeClr val="tx1"/>
+          </a:fontRef>
+        </p:style>
+      </p:cxnSp>
+      <p:sp>
+        <p:nvSpPr>
+          <p:cNvPr id="95" name="Rectangle 94"/>
+          <p:cNvSpPr/>
+          <p:nvPr/>
+        </p:nvSpPr>
+        <p:spPr>
+          <a:xfrm>
+            <a:off x="152400" y="2362200"/>
+            <a:ext cx="2590800" cy="261610"/>
+          </a:xfrm>
+          <a:prstGeom prst="rect">
+            <a:avLst/>
+          </a:prstGeom>
+        </p:spPr>
+        <p:txBody>
+          <a:bodyPr wrap="square">
+            <a:spAutoFit/>
+          </a:bodyPr>
+          <a:lstStyle/>
+          <a:p>
+            <a:r>
+              <a:rPr lang="en-US" sz="1100" smtClean="0"/>
+              <a:t>edu.cmu.cs.in.hoop.properties.types</a:t>
+            </a:r>
+            <a:endParaRPr lang="en-US" sz="1100"/>
+          </a:p>
+        </p:txBody>
+      </p:sp>
+      <p:cxnSp>
+        <p:nvCxnSpPr>
+          <p:cNvPr id="102" name="Straight Connector 101"/>
+          <p:cNvCxnSpPr/>
+          <p:nvPr/>
+        </p:nvCxnSpPr>
+        <p:spPr>
+          <a:xfrm flipH="1">
+            <a:off x="152400" y="2362200"/>
+            <a:ext cx="3200400" cy="0"/>
+          </a:xfrm>
+          <a:prstGeom prst="line">
+            <a:avLst/>
+          </a:prstGeom>
+          <a:ln>
+            <a:prstDash val="dash"/>
+          </a:ln>
+        </p:spPr>
+        <p:style>
+          <a:lnRef idx="1">
+            <a:schemeClr val="accent1"/>
+          </a:lnRef>
+          <a:fillRef idx="0">
+            <a:schemeClr val="accent1"/>
+          </a:fillRef>
+          <a:effectRef idx="0">
+            <a:schemeClr val="accent1"/>
+          </a:effectRef>
+          <a:fontRef idx="minor">
+            <a:schemeClr val="tx1"/>
+          </a:fontRef>
+        </p:style>
+      </p:cxnSp>
+      <p:sp>
+        <p:nvSpPr>
+          <p:cNvPr id="110" name="Rectangle 109"/>
+          <p:cNvSpPr/>
+          <p:nvPr/>
+        </p:nvSpPr>
+        <p:spPr>
+          <a:xfrm>
+            <a:off x="152400" y="3276600"/>
+            <a:ext cx="1609736" cy="261610"/>
+          </a:xfrm>
+          <a:prstGeom prst="rect">
+            <a:avLst/>
+          </a:prstGeom>
+        </p:spPr>
+        <p:txBody>
+          <a:bodyPr wrap="none">
+            <a:spAutoFit/>
+          </a:bodyPr>
+          <a:lstStyle/>
+          <a:p>
+            <a:r>
+              <a:rPr lang="en-US" sz="1100" smtClean="0"/>
+              <a:t>HoopBooleanSerializable</a:t>
+            </a:r>
+            <a:endParaRPr lang="en-US" sz="1100"/>
+          </a:p>
+        </p:txBody>
+      </p:sp>
+      <p:sp>
+        <p:nvSpPr>
+          <p:cNvPr id="111" name="Rectangle 110"/>
+          <p:cNvSpPr/>
+          <p:nvPr/>
+        </p:nvSpPr>
+        <p:spPr>
+          <a:xfrm>
+            <a:off x="152400" y="3810000"/>
+            <a:ext cx="1470274" cy="261610"/>
+          </a:xfrm>
+          <a:prstGeom prst="rect">
+            <a:avLst/>
+          </a:prstGeom>
+        </p:spPr>
+        <p:txBody>
+          <a:bodyPr wrap="none">
+            <a:spAutoFit/>
+          </a:bodyPr>
+          <a:lstStyle/>
+          <a:p>
+            <a:r>
+              <a:rPr lang="en-US" sz="1100" smtClean="0"/>
+              <a:t>HoopEnumSerializable</a:t>
+            </a:r>
+            <a:endParaRPr lang="en-US" sz="1100"/>
+          </a:p>
+        </p:txBody>
+      </p:sp>
+      <p:sp>
+        <p:nvSpPr>
+          <p:cNvPr id="112" name="Rectangle 111"/>
+          <p:cNvSpPr/>
+          <p:nvPr/>
+        </p:nvSpPr>
+        <p:spPr>
+          <a:xfrm>
+            <a:off x="152400" y="4343400"/>
+            <a:ext cx="1553630" cy="261610"/>
+          </a:xfrm>
+          <a:prstGeom prst="rect">
+            <a:avLst/>
+          </a:prstGeom>
+        </p:spPr>
+        <p:txBody>
+          <a:bodyPr wrap="none">
+            <a:spAutoFit/>
+          </a:bodyPr>
+          <a:lstStyle/>
+          <a:p>
+            <a:r>
+              <a:rPr lang="en-US" sz="1100" smtClean="0"/>
+              <a:t>HoopIntegerSerializable</a:t>
+            </a:r>
+            <a:endParaRPr lang="en-US" sz="1100"/>
+          </a:p>
+        </p:txBody>
+      </p:sp>
+      <p:sp>
+        <p:nvSpPr>
+          <p:cNvPr id="113" name="Rectangle 112"/>
+          <p:cNvSpPr/>
+          <p:nvPr/>
+        </p:nvSpPr>
+        <p:spPr>
+          <a:xfrm>
+            <a:off x="152400" y="4953000"/>
+            <a:ext cx="1473480" cy="261610"/>
+          </a:xfrm>
+          <a:prstGeom prst="rect">
+            <a:avLst/>
+          </a:prstGeom>
+        </p:spPr>
+        <p:txBody>
+          <a:bodyPr wrap="none">
+            <a:spAutoFit/>
+          </a:bodyPr>
+          <a:lstStyle/>
+          <a:p>
+            <a:r>
+              <a:rPr lang="en-US" sz="1100" smtClean="0"/>
+              <a:t>HoopStringSerializable</a:t>
+            </a:r>
+            <a:endParaRPr lang="en-US" sz="1100"/>
+          </a:p>
+        </p:txBody>
+      </p:sp>
+      <p:sp>
+        <p:nvSpPr>
+          <p:cNvPr id="114" name="Rectangle 113"/>
+          <p:cNvSpPr/>
+          <p:nvPr/>
+        </p:nvSpPr>
+        <p:spPr>
+          <a:xfrm>
+            <a:off x="152400" y="5562600"/>
+            <a:ext cx="1343638" cy="261610"/>
+          </a:xfrm>
+          <a:prstGeom prst="rect">
+            <a:avLst/>
+          </a:prstGeom>
+        </p:spPr>
+        <p:txBody>
+          <a:bodyPr wrap="none">
+            <a:spAutoFit/>
+          </a:bodyPr>
+          <a:lstStyle/>
+          <a:p>
+            <a:r>
+              <a:rPr lang="en-US" sz="1100" smtClean="0"/>
+              <a:t>HoopURISerializable</a:t>
+            </a:r>
+            <a:endParaRPr lang="en-US" sz="1100"/>
+          </a:p>
+        </p:txBody>
+      </p:sp>
+      <p:cxnSp>
+        <p:nvCxnSpPr>
+          <p:cNvPr id="116" name="Straight Arrow Connector 115"/>
+          <p:cNvCxnSpPr>
+            <a:stCxn id="110" idx="3"/>
+            <a:endCxn id="89" idx="1"/>
+          </p:cNvCxnSpPr>
+          <p:nvPr/>
+        </p:nvCxnSpPr>
+        <p:spPr>
+          <a:xfrm>
+            <a:off x="1762136" y="3407405"/>
+            <a:ext cx="219064" cy="1066800"/>
+          </a:xfrm>
+          <a:prstGeom prst="straightConnector1">
+            <a:avLst/>
+          </a:prstGeom>
+          <a:ln w="12700">
+            <a:solidFill>
+              <a:schemeClr val="tx1"/>
+            </a:solidFill>
+            <a:tailEnd type="triangle" w="med" len="med"/>
+          </a:ln>
+        </p:spPr>
+        <p:style>
+          <a:lnRef idx="1">
+            <a:schemeClr val="accent1"/>
+          </a:lnRef>
+          <a:fillRef idx="0">
+            <a:schemeClr val="accent1"/>
+          </a:fillRef>
+          <a:effectRef idx="0">
+            <a:schemeClr val="accent1"/>
+          </a:effectRef>
+          <a:fontRef idx="minor">
+            <a:schemeClr val="tx1"/>
+          </a:fontRef>
+        </p:style>
+      </p:cxnSp>
+      <p:cxnSp>
+        <p:nvCxnSpPr>
+          <p:cNvPr id="122" name="Straight Arrow Connector 121"/>
+          <p:cNvCxnSpPr>
+            <a:stCxn id="111" idx="3"/>
+            <a:endCxn id="89" idx="1"/>
+          </p:cNvCxnSpPr>
+          <p:nvPr/>
+        </p:nvCxnSpPr>
+        <p:spPr>
+          <a:xfrm>
+            <a:off x="1622674" y="3940805"/>
+            <a:ext cx="358526" cy="533400"/>
+          </a:xfrm>
+          <a:prstGeom prst="straightConnector1">
+            <a:avLst/>
+          </a:prstGeom>
+          <a:ln w="12700">
+            <a:solidFill>
+              <a:schemeClr val="tx1"/>
+            </a:solidFill>
+            <a:tailEnd type="triangle" w="med" len="med"/>
+          </a:ln>
+        </p:spPr>
+        <p:style>
+          <a:lnRef idx="1">
+            <a:schemeClr val="accent1"/>
+          </a:lnRef>
+          <a:fillRef idx="0">
+            <a:schemeClr val="accent1"/>
+          </a:fillRef>
+          <a:effectRef idx="0">
+            <a:schemeClr val="accent1"/>
+          </a:effectRef>
+          <a:fontRef idx="minor">
+            <a:schemeClr val="tx1"/>
+          </a:fontRef>
+        </p:style>
+      </p:cxnSp>
+      <p:cxnSp>
+        <p:nvCxnSpPr>
+          <p:cNvPr id="125" name="Straight Arrow Connector 124"/>
+          <p:cNvCxnSpPr>
+            <a:stCxn id="112" idx="3"/>
+            <a:endCxn id="89" idx="1"/>
+          </p:cNvCxnSpPr>
+          <p:nvPr/>
+        </p:nvCxnSpPr>
+        <p:spPr>
+          <a:xfrm>
+            <a:off x="1706030" y="4474205"/>
+            <a:ext cx="275170" cy="0"/>
+          </a:xfrm>
+          <a:prstGeom prst="straightConnector1">
+            <a:avLst/>
+          </a:prstGeom>
+          <a:ln w="12700">
+            <a:solidFill>
+              <a:schemeClr val="tx1"/>
+            </a:solidFill>
+            <a:tailEnd type="triangle" w="med" len="med"/>
+          </a:ln>
+        </p:spPr>
+        <p:style>
+          <a:lnRef idx="1">
+            <a:schemeClr val="accent1"/>
+          </a:lnRef>
+          <a:fillRef idx="0">
+            <a:schemeClr val="accent1"/>
+          </a:fillRef>
+          <a:effectRef idx="0">
+            <a:schemeClr val="accent1"/>
+          </a:effectRef>
+          <a:fontRef idx="minor">
+            <a:schemeClr val="tx1"/>
+          </a:fontRef>
+        </p:style>
+      </p:cxnSp>
+      <p:cxnSp>
+        <p:nvCxnSpPr>
+          <p:cNvPr id="128" name="Straight Arrow Connector 127"/>
+          <p:cNvCxnSpPr>
+            <a:endCxn id="89" idx="1"/>
+          </p:cNvCxnSpPr>
+          <p:nvPr/>
+        </p:nvCxnSpPr>
+        <p:spPr>
+          <a:xfrm flipV="1">
+            <a:off x="1676400" y="4474205"/>
+            <a:ext cx="304800" cy="554996"/>
+          </a:xfrm>
+          <a:prstGeom prst="straightConnector1">
+            <a:avLst/>
+          </a:prstGeom>
+          <a:ln w="12700">
+            <a:solidFill>
+              <a:schemeClr val="tx1"/>
+            </a:solidFill>
+            <a:tailEnd type="triangle" w="med" len="med"/>
+          </a:ln>
+        </p:spPr>
+        <p:style>
+          <a:lnRef idx="1">
+            <a:schemeClr val="accent1"/>
+          </a:lnRef>
+          <a:fillRef idx="0">
+            <a:schemeClr val="accent1"/>
+          </a:fillRef>
+          <a:effectRef idx="0">
+            <a:schemeClr val="accent1"/>
+          </a:effectRef>
+          <a:fontRef idx="minor">
+            <a:schemeClr val="tx1"/>
+          </a:fontRef>
+        </p:style>
+      </p:cxnSp>
+      <p:cxnSp>
+        <p:nvCxnSpPr>
+          <p:cNvPr id="131" name="Straight Arrow Connector 130"/>
+          <p:cNvCxnSpPr>
+            <a:stCxn id="114" idx="3"/>
+            <a:endCxn id="89" idx="1"/>
+          </p:cNvCxnSpPr>
+          <p:nvPr/>
+        </p:nvCxnSpPr>
+        <p:spPr>
+          <a:xfrm flipV="1">
+            <a:off x="1496038" y="4474205"/>
+            <a:ext cx="485162" cy="1219200"/>
+          </a:xfrm>
+          <a:prstGeom prst="straightConnector1">
+            <a:avLst/>
+          </a:prstGeom>
+          <a:ln w="12700">
+            <a:solidFill>
+              <a:schemeClr val="tx1"/>
+            </a:solidFill>
+            <a:tailEnd type="triangle" w="med" len="med"/>
+          </a:ln>
+        </p:spPr>
+        <p:style>
+          <a:lnRef idx="1">
+            <a:schemeClr val="accent1"/>
+          </a:lnRef>
+          <a:fillRef idx="0">
+            <a:schemeClr val="accent1"/>
+          </a:fillRef>
+          <a:effectRef idx="0">
+            <a:schemeClr val="accent1"/>
+          </a:effectRef>
+          <a:fontRef idx="minor">
+            <a:schemeClr val="tx1"/>
+          </a:fontRef>
+        </p:style>
+      </p:cxnSp>
+      <p:sp>
+        <p:nvSpPr>
+          <p:cNvPr id="134" name="Rectangle 133"/>
+          <p:cNvSpPr/>
+          <p:nvPr/>
+        </p:nvSpPr>
+        <p:spPr>
+          <a:xfrm>
+            <a:off x="3352800" y="228600"/>
+            <a:ext cx="1989647" cy="261610"/>
+          </a:xfrm>
+          <a:prstGeom prst="rect">
+            <a:avLst/>
+          </a:prstGeom>
+        </p:spPr>
+        <p:txBody>
+          <a:bodyPr wrap="none">
+            <a:spAutoFit/>
+          </a:bodyPr>
+          <a:lstStyle/>
+          <a:p>
+            <a:r>
+              <a:rPr lang="en-US" sz="1100" smtClean="0"/>
+              <a:t>edu.cmu.cs.in.hoop.hoops.base</a:t>
+            </a:r>
+            <a:endParaRPr lang="en-US" sz="1100"/>
+          </a:p>
+        </p:txBody>
+      </p:sp>
+      <p:sp>
+        <p:nvSpPr>
+          <p:cNvPr id="135" name="Rectangle 134"/>
+          <p:cNvSpPr/>
+          <p:nvPr/>
+        </p:nvSpPr>
+        <p:spPr>
+          <a:xfrm>
+            <a:off x="152400" y="2100590"/>
+            <a:ext cx="1933543" cy="261610"/>
+          </a:xfrm>
+          <a:prstGeom prst="rect">
+            <a:avLst/>
+          </a:prstGeom>
+        </p:spPr>
+        <p:txBody>
+          <a:bodyPr wrap="none">
+            <a:spAutoFit/>
+          </a:bodyPr>
+          <a:lstStyle/>
+          <a:p>
+            <a:r>
+              <a:rPr lang="en-US" sz="1100" smtClean="0"/>
+              <a:t>edu.cmu.cs.in.hoop.properties</a:t>
+            </a:r>
+            <a:endParaRPr lang="en-US" sz="1100"/>
+          </a:p>
+        </p:txBody>
+      </p:sp>
+      <p:sp>
+        <p:nvSpPr>
+          <p:cNvPr id="136" name="Rectangle 135"/>
+          <p:cNvSpPr/>
+          <p:nvPr/>
+        </p:nvSpPr>
+        <p:spPr>
+          <a:xfrm>
+            <a:off x="1981200" y="1143000"/>
+            <a:ext cx="1143000" cy="261610"/>
+          </a:xfrm>
+          <a:prstGeom prst="rect">
+            <a:avLst/>
+          </a:prstGeom>
+          <a:ln>
+            <a:solidFill>
+              <a:schemeClr val="accent1">
+                <a:shade val="95000"/>
+                <a:satMod val="105000"/>
+              </a:schemeClr>
+            </a:solidFill>
+          </a:ln>
+        </p:spPr>
+        <p:txBody>
+          <a:bodyPr wrap="square">
+            <a:spAutoFit/>
+          </a:bodyPr>
+          <a:lstStyle/>
+          <a:p>
+            <a:r>
+              <a:rPr lang="en-US" sz="1100" smtClean="0"/>
+              <a:t>HoopXMLBase</a:t>
+            </a:r>
+            <a:endParaRPr lang="en-US" sz="1100"/>
+          </a:p>
+        </p:txBody>
+      </p:sp>
+      <p:cxnSp>
+        <p:nvCxnSpPr>
+          <p:cNvPr id="137" name="Straight Arrow Connector 136"/>
+          <p:cNvCxnSpPr>
+            <a:stCxn id="136" idx="2"/>
+            <a:endCxn id="69" idx="0"/>
+          </p:cNvCxnSpPr>
+          <p:nvPr/>
+        </p:nvCxnSpPr>
+        <p:spPr>
+          <a:xfrm flipH="1">
+            <a:off x="2543867" y="1404610"/>
+            <a:ext cx="8833" cy="500390"/>
+          </a:xfrm>
+          <a:prstGeom prst="straightConnector1">
+            <a:avLst/>
+          </a:prstGeom>
+          <a:ln w="12700">
+            <a:solidFill>
+              <a:schemeClr val="tx1"/>
+            </a:solidFill>
+            <a:tailEnd type="triangle" w="med" len="med"/>
+          </a:ln>
+        </p:spPr>
+        <p:style>
+          <a:lnRef idx="1">
+            <a:schemeClr val="accent1"/>
+          </a:lnRef>
+          <a:fillRef idx="0">
+            <a:schemeClr val="accent1"/>
+          </a:fillRef>
+          <a:effectRef idx="0">
+            <a:schemeClr val="accent1"/>
+          </a:effectRef>
+          <a:fontRef idx="minor">
+            <a:schemeClr val="tx1"/>
+          </a:fontRef>
+        </p:style>
+      </p:cxnSp>
+      <p:sp>
+        <p:nvSpPr>
+          <p:cNvPr id="144" name="Rectangle 143"/>
+          <p:cNvSpPr/>
+          <p:nvPr/>
+        </p:nvSpPr>
+        <p:spPr>
+          <a:xfrm>
+            <a:off x="152400" y="1524000"/>
+            <a:ext cx="1274708" cy="261610"/>
+          </a:xfrm>
+          <a:prstGeom prst="rect">
+            <a:avLst/>
+          </a:prstGeom>
+        </p:spPr>
+        <p:txBody>
+          <a:bodyPr wrap="none">
+            <a:spAutoFit/>
+          </a:bodyPr>
+          <a:lstStyle/>
+          <a:p>
+            <a:r>
+              <a:rPr lang="en-US" sz="1100" smtClean="0"/>
+              <a:t>edu.cmu.cs.in.base</a:t>
+            </a:r>
+            <a:endParaRPr lang="en-US" sz="1100"/>
+          </a:p>
+        </p:txBody>
+      </p:sp>
+      <p:cxnSp>
+        <p:nvCxnSpPr>
+          <p:cNvPr id="145" name="Straight Connector 144"/>
+          <p:cNvCxnSpPr/>
+          <p:nvPr/>
+        </p:nvCxnSpPr>
+        <p:spPr>
+          <a:xfrm flipH="1">
+            <a:off x="152400" y="1752600"/>
+            <a:ext cx="3200400" cy="0"/>
+          </a:xfrm>
+          <a:prstGeom prst="line">
+            <a:avLst/>
+          </a:prstGeom>
+          <a:ln>
+            <a:prstDash val="dash"/>
+          </a:ln>
+        </p:spPr>
+        <p:style>
+          <a:lnRef idx="1">
+            <a:schemeClr val="accent1"/>
+          </a:lnRef>
+          <a:fillRef idx="0">
+            <a:schemeClr val="accent1"/>
+          </a:fillRef>
+          <a:effectRef idx="0">
+            <a:schemeClr val="accent1"/>
+          </a:effectRef>
+          <a:fontRef idx="minor">
+            <a:schemeClr val="tx1"/>
+          </a:fontRef>
+        </p:style>
+      </p:cxnSp>
+      <p:sp>
+        <p:nvSpPr>
+          <p:cNvPr id="146" name="Rectangle 145"/>
+          <p:cNvSpPr/>
+          <p:nvPr/>
+        </p:nvSpPr>
+        <p:spPr>
+          <a:xfrm>
+            <a:off x="1981200" y="5257800"/>
+            <a:ext cx="1143000" cy="261610"/>
+          </a:xfrm>
+          <a:prstGeom prst="rect">
+            <a:avLst/>
+          </a:prstGeom>
+          <a:ln>
+            <a:solidFill>
+              <a:schemeClr val="accent1">
+                <a:shade val="95000"/>
+                <a:satMod val="105000"/>
+              </a:schemeClr>
+            </a:solidFill>
+          </a:ln>
+        </p:spPr>
+        <p:txBody>
+          <a:bodyPr wrap="square">
+            <a:spAutoFit/>
+          </a:bodyPr>
+          <a:lstStyle/>
+          <a:p>
+            <a:r>
+              <a:rPr lang="en-US" sz="1100" smtClean="0"/>
+              <a:t>HoopXMLBase</a:t>
+            </a:r>
+            <a:endParaRPr lang="en-US" sz="1100"/>
+          </a:p>
+        </p:txBody>
+      </p:sp>
+      <p:cxnSp>
+        <p:nvCxnSpPr>
+          <p:cNvPr id="147" name="Straight Arrow Connector 146"/>
+          <p:cNvCxnSpPr>
+            <a:stCxn id="146" idx="0"/>
+            <a:endCxn id="89" idx="2"/>
+          </p:cNvCxnSpPr>
+          <p:nvPr/>
+        </p:nvCxnSpPr>
+        <p:spPr>
+          <a:xfrm flipH="1" flipV="1">
+            <a:off x="2552030" y="4605010"/>
+            <a:ext cx="670" cy="652790"/>
+          </a:xfrm>
+          <a:prstGeom prst="straightConnector1">
+            <a:avLst/>
+          </a:prstGeom>
+          <a:ln w="12700">
+            <a:solidFill>
+              <a:schemeClr val="tx1"/>
+            </a:solidFill>
+            <a:tailEnd type="triangle" w="med" len="med"/>
+          </a:ln>
+        </p:spPr>
+        <p:style>
+          <a:lnRef idx="1">
+            <a:schemeClr val="accent1"/>
+          </a:lnRef>
+          <a:fillRef idx="0">
+            <a:schemeClr val="accent1"/>
+          </a:fillRef>
+          <a:effectRef idx="0">
+            <a:schemeClr val="accent1"/>
+          </a:effectRef>
+          <a:fontRef idx="minor">
+            <a:schemeClr val="tx1"/>
+          </a:fontRef>
+        </p:style>
+      </p:cxnSp>
     </p:spTree>
   </p:cSld>
   <p:clrMapOvr>
@@ -5561,6 +7388,68 @@
           <a:chExt cx="0" cy="0"/>
         </a:xfrm>
       </p:grpSpPr>
+      <p:sp>
+        <p:nvSpPr>
+          <p:cNvPr id="2" name="Oval 1"/>
+          <p:cNvSpPr/>
+          <p:nvPr/>
+        </p:nvSpPr>
+        <p:spPr>
+          <a:xfrm>
+            <a:off x="152400" y="152400"/>
+            <a:ext cx="381000" cy="381000"/>
+          </a:xfrm>
+          <a:prstGeom prst="ellipse">
+            <a:avLst/>
+          </a:prstGeom>
+          <a:solidFill>
+            <a:schemeClr val="bg2">
+              <a:lumMod val="90000"/>
+            </a:schemeClr>
+          </a:solidFill>
+          <a:ln>
+            <a:solidFill>
+              <a:schemeClr val="tx1"/>
+            </a:solidFill>
+          </a:ln>
+        </p:spPr>
+        <p:style>
+          <a:lnRef idx="2">
+            <a:schemeClr val="accent1">
+              <a:shade val="50000"/>
+            </a:schemeClr>
+          </a:lnRef>
+          <a:fillRef idx="1">
+            <a:schemeClr val="accent1"/>
+          </a:fillRef>
+          <a:effectRef idx="0">
+            <a:schemeClr val="accent1"/>
+          </a:effectRef>
+          <a:fontRef idx="minor">
+            <a:schemeClr val="lt1"/>
+          </a:fontRef>
+        </p:style>
+        <p:txBody>
+          <a:bodyPr rtlCol="0" anchor="ctr"/>
+          <a:lstStyle/>
+          <a:p>
+            <a:pPr algn="ctr"/>
+            <a:r>
+              <a:rPr lang="en-US" b="1" smtClean="0">
+                <a:solidFill>
+                  <a:schemeClr val="tx1"/>
+                </a:solidFill>
+              </a:rPr>
+              <a:t>B</a:t>
+            </a:r>
+            <a:endParaRPr lang="en-US" b="1">
+              <a:solidFill>
+                <a:schemeClr val="tx1"/>
+              </a:solidFill>
+            </a:endParaRPr>
+          </a:p>
+        </p:txBody>
+      </p:sp>
     </p:spTree>
   </p:cSld>
   <p:clrMapOvr>

</xml_diff>

<commit_message>
Lots of cleanup so that the repository doesn't foul up. Finished a proper version of the Hoop/UIMA UML. Started the construction of Weka support as an analyze hoop
</commit_message>
<xml_diff>
--- a/Resources/Documentation/UML+DomainModels.pptx
+++ b/Resources/Documentation/UML+DomainModels.pptx
@@ -15,6 +15,7 @@
     <p:sldId id="260" r:id="rId9"/>
     <p:sldId id="261" r:id="rId10"/>
     <p:sldId id="262" r:id="rId11"/>
+    <p:sldId id="266" r:id="rId12"/>
   </p:sldIdLst>
   <p:sldSz cx="9144000" cy="6858000" type="screen4x3"/>
   <p:notesSz cx="6985000" cy="9283700"/>
@@ -298,7 +299,7 @@
             <a:fld id="{1D8BD707-D9CF-40AE-B4C6-C98DA3205C09}" type="datetimeFigureOut">
               <a:rPr lang="en-US" smtClean="0"/>
               <a:pPr/>
-              <a:t>2/13/2013</a:t>
+              <a:t>2/15/2013</a:t>
             </a:fld>
             <a:endParaRPr lang="en-US"/>
           </a:p>
@@ -465,7 +466,7 @@
             <a:fld id="{1D8BD707-D9CF-40AE-B4C6-C98DA3205C09}" type="datetimeFigureOut">
               <a:rPr lang="en-US" smtClean="0"/>
               <a:pPr/>
-              <a:t>2/13/2013</a:t>
+              <a:t>2/15/2013</a:t>
             </a:fld>
             <a:endParaRPr lang="en-US"/>
           </a:p>
@@ -642,7 +643,7 @@
             <a:fld id="{1D8BD707-D9CF-40AE-B4C6-C98DA3205C09}" type="datetimeFigureOut">
               <a:rPr lang="en-US" smtClean="0"/>
               <a:pPr/>
-              <a:t>2/13/2013</a:t>
+              <a:t>2/15/2013</a:t>
             </a:fld>
             <a:endParaRPr lang="en-US"/>
           </a:p>
@@ -809,7 +810,7 @@
             <a:fld id="{1D8BD707-D9CF-40AE-B4C6-C98DA3205C09}" type="datetimeFigureOut">
               <a:rPr lang="en-US" smtClean="0"/>
               <a:pPr/>
-              <a:t>2/13/2013</a:t>
+              <a:t>2/15/2013</a:t>
             </a:fld>
             <a:endParaRPr lang="en-US"/>
           </a:p>
@@ -1052,7 +1053,7 @@
             <a:fld id="{1D8BD707-D9CF-40AE-B4C6-C98DA3205C09}" type="datetimeFigureOut">
               <a:rPr lang="en-US" smtClean="0"/>
               <a:pPr/>
-              <a:t>2/13/2013</a:t>
+              <a:t>2/15/2013</a:t>
             </a:fld>
             <a:endParaRPr lang="en-US"/>
           </a:p>
@@ -1337,7 +1338,7 @@
             <a:fld id="{1D8BD707-D9CF-40AE-B4C6-C98DA3205C09}" type="datetimeFigureOut">
               <a:rPr lang="en-US" smtClean="0"/>
               <a:pPr/>
-              <a:t>2/13/2013</a:t>
+              <a:t>2/15/2013</a:t>
             </a:fld>
             <a:endParaRPr lang="en-US"/>
           </a:p>
@@ -1756,7 +1757,7 @@
             <a:fld id="{1D8BD707-D9CF-40AE-B4C6-C98DA3205C09}" type="datetimeFigureOut">
               <a:rPr lang="en-US" smtClean="0"/>
               <a:pPr/>
-              <a:t>2/13/2013</a:t>
+              <a:t>2/15/2013</a:t>
             </a:fld>
             <a:endParaRPr lang="en-US"/>
           </a:p>
@@ -1871,7 +1872,7 @@
             <a:fld id="{1D8BD707-D9CF-40AE-B4C6-C98DA3205C09}" type="datetimeFigureOut">
               <a:rPr lang="en-US" smtClean="0"/>
               <a:pPr/>
-              <a:t>2/13/2013</a:t>
+              <a:t>2/15/2013</a:t>
             </a:fld>
             <a:endParaRPr lang="en-US"/>
           </a:p>
@@ -1963,7 +1964,7 @@
             <a:fld id="{1D8BD707-D9CF-40AE-B4C6-C98DA3205C09}" type="datetimeFigureOut">
               <a:rPr lang="en-US" smtClean="0"/>
               <a:pPr/>
-              <a:t>2/13/2013</a:t>
+              <a:t>2/15/2013</a:t>
             </a:fld>
             <a:endParaRPr lang="en-US"/>
           </a:p>
@@ -2237,7 +2238,7 @@
             <a:fld id="{1D8BD707-D9CF-40AE-B4C6-C98DA3205C09}" type="datetimeFigureOut">
               <a:rPr lang="en-US" smtClean="0"/>
               <a:pPr/>
-              <a:t>2/13/2013</a:t>
+              <a:t>2/15/2013</a:t>
             </a:fld>
             <a:endParaRPr lang="en-US"/>
           </a:p>
@@ -2487,7 +2488,7 @@
             <a:fld id="{1D8BD707-D9CF-40AE-B4C6-C98DA3205C09}" type="datetimeFigureOut">
               <a:rPr lang="en-US" smtClean="0"/>
               <a:pPr/>
-              <a:t>2/13/2013</a:t>
+              <a:t>2/15/2013</a:t>
             </a:fld>
             <a:endParaRPr lang="en-US"/>
           </a:p>
@@ -2697,7 +2698,7 @@
             <a:fld id="{1D8BD707-D9CF-40AE-B4C6-C98DA3205C09}" type="datetimeFigureOut">
               <a:rPr lang="en-US" smtClean="0"/>
               <a:pPr/>
-              <a:t>2/13/2013</a:t>
+              <a:t>2/15/2013</a:t>
             </a:fld>
             <a:endParaRPr lang="en-US"/>
           </a:p>
@@ -3284,7 +3285,7 @@
         <p:spPr>
           <a:xfrm>
             <a:off x="612637" y="152400"/>
-            <a:ext cx="3795270" cy="369332"/>
+            <a:ext cx="3014030" cy="369332"/>
           </a:xfrm>
           <a:prstGeom prst="rect">
             <a:avLst/>
@@ -3298,7 +3299,7 @@
           <a:p>
             <a:r>
               <a:rPr lang="en-US" smtClean="0"/>
-              <a:t>UIMA/Hoop KV data type specification</a:t>
+              <a:t>Hoop/UIMA Analytic Interface</a:t>
             </a:r>
             <a:endParaRPr lang="en-US"/>
           </a:p>
@@ -4464,6 +4465,1099 @@
 </p:sld>
 </file>
 
+<file path=ppt/slides/slide11.xml><?xml version="1.0" encoding="utf-8"?>
+<p:sld xmlns:a="http://schemas.openxmlformats.org/drawingml/2006/main" xmlns:r="http://schemas.openxmlformats.org/officeDocument/2006/relationships" xmlns:p="http://schemas.openxmlformats.org/presentationml/2006/main">
+  <p:cSld>
+    <p:spTree>
+      <p:nvGrpSpPr>
+        <p:cNvPr id="1" name=""/>
+        <p:cNvGrpSpPr/>
+        <p:nvPr/>
+      </p:nvGrpSpPr>
+      <p:grpSpPr>
+        <a:xfrm>
+          <a:off x="0" y="0"/>
+          <a:ext cx="0" cy="0"/>
+          <a:chOff x="0" y="0"/>
+          <a:chExt cx="0" cy="0"/>
+        </a:xfrm>
+      </p:grpSpPr>
+      <p:sp>
+        <p:nvSpPr>
+          <p:cNvPr id="7" name="Oval 6"/>
+          <p:cNvSpPr/>
+          <p:nvPr/>
+        </p:nvSpPr>
+        <p:spPr>
+          <a:xfrm>
+            <a:off x="152400" y="152400"/>
+            <a:ext cx="381000" cy="381000"/>
+          </a:xfrm>
+          <a:prstGeom prst="ellipse">
+            <a:avLst/>
+          </a:prstGeom>
+          <a:solidFill>
+            <a:schemeClr val="bg2">
+              <a:lumMod val="90000"/>
+            </a:schemeClr>
+          </a:solidFill>
+          <a:ln>
+            <a:solidFill>
+              <a:schemeClr val="tx1"/>
+            </a:solidFill>
+          </a:ln>
+        </p:spPr>
+        <p:style>
+          <a:lnRef idx="2">
+            <a:schemeClr val="accent1">
+              <a:shade val="50000"/>
+            </a:schemeClr>
+          </a:lnRef>
+          <a:fillRef idx="1">
+            <a:schemeClr val="accent1"/>
+          </a:fillRef>
+          <a:effectRef idx="0">
+            <a:schemeClr val="accent1"/>
+          </a:effectRef>
+          <a:fontRef idx="minor">
+            <a:schemeClr val="lt1"/>
+          </a:fontRef>
+        </p:style>
+        <p:txBody>
+          <a:bodyPr rtlCol="0" anchor="ctr"/>
+          <a:lstStyle/>
+          <a:p>
+            <a:pPr algn="ctr"/>
+            <a:r>
+              <a:rPr lang="en-US" b="1" smtClean="0">
+                <a:solidFill>
+                  <a:schemeClr val="tx1"/>
+                </a:solidFill>
+              </a:rPr>
+              <a:t>F</a:t>
+            </a:r>
+            <a:endParaRPr lang="en-US" b="1">
+              <a:solidFill>
+                <a:schemeClr val="tx1"/>
+              </a:solidFill>
+            </a:endParaRPr>
+          </a:p>
+        </p:txBody>
+      </p:sp>
+      <p:sp>
+        <p:nvSpPr>
+          <p:cNvPr id="8" name="TextBox 7"/>
+          <p:cNvSpPr txBox="1"/>
+          <p:nvPr/>
+        </p:nvSpPr>
+        <p:spPr>
+          <a:xfrm>
+            <a:off x="457200" y="381000"/>
+            <a:ext cx="256802" cy="261610"/>
+          </a:xfrm>
+          <a:prstGeom prst="rect">
+            <a:avLst/>
+          </a:prstGeom>
+          <a:noFill/>
+        </p:spPr>
+        <p:txBody>
+          <a:bodyPr wrap="none" rtlCol="0">
+            <a:spAutoFit/>
+          </a:bodyPr>
+          <a:lstStyle/>
+          <a:p>
+            <a:r>
+              <a:rPr lang="en-US" sz="1100" b="1" smtClean="0"/>
+              <a:t>4</a:t>
+            </a:r>
+            <a:endParaRPr lang="en-US" sz="1100" b="1"/>
+          </a:p>
+        </p:txBody>
+      </p:sp>
+      <p:sp>
+        <p:nvSpPr>
+          <p:cNvPr id="9" name="Rectangle 8"/>
+          <p:cNvSpPr/>
+          <p:nvPr/>
+        </p:nvSpPr>
+        <p:spPr>
+          <a:xfrm>
+            <a:off x="612637" y="152400"/>
+            <a:ext cx="3795270" cy="369332"/>
+          </a:xfrm>
+          <a:prstGeom prst="rect">
+            <a:avLst/>
+          </a:prstGeom>
+        </p:spPr>
+        <p:txBody>
+          <a:bodyPr wrap="none">
+            <a:spAutoFit/>
+          </a:bodyPr>
+          <a:lstStyle/>
+          <a:p>
+            <a:r>
+              <a:rPr lang="en-US" smtClean="0"/>
+              <a:t>UIMA/Hoop KV data type specification</a:t>
+            </a:r>
+            <a:endParaRPr lang="en-US"/>
+          </a:p>
+        </p:txBody>
+      </p:sp>
+      <p:grpSp>
+        <p:nvGrpSpPr>
+          <p:cNvPr id="14" name="Group 13"/>
+          <p:cNvGrpSpPr/>
+          <p:nvPr/>
+        </p:nvGrpSpPr>
+        <p:grpSpPr>
+          <a:xfrm>
+            <a:off x="3200400" y="5029200"/>
+            <a:ext cx="1905000" cy="1143000"/>
+            <a:chOff x="3352800" y="4114800"/>
+            <a:chExt cx="1905000" cy="1143000"/>
+          </a:xfrm>
+        </p:grpSpPr>
+        <p:sp>
+          <p:nvSpPr>
+            <p:cNvPr id="15" name="Rectangle 14"/>
+            <p:cNvSpPr/>
+            <p:nvPr/>
+          </p:nvSpPr>
+          <p:spPr>
+            <a:xfrm>
+              <a:off x="3352800" y="4114800"/>
+              <a:ext cx="1905000" cy="1143000"/>
+            </a:xfrm>
+            <a:prstGeom prst="rect">
+              <a:avLst/>
+            </a:prstGeom>
+            <a:solidFill>
+              <a:schemeClr val="bg1"/>
+            </a:solidFill>
+            <a:ln>
+              <a:solidFill>
+                <a:schemeClr val="tx1"/>
+              </a:solidFill>
+            </a:ln>
+          </p:spPr>
+          <p:style>
+            <a:lnRef idx="2">
+              <a:schemeClr val="accent1">
+                <a:shade val="50000"/>
+              </a:schemeClr>
+            </a:lnRef>
+            <a:fillRef idx="1">
+              <a:schemeClr val="accent1"/>
+            </a:fillRef>
+            <a:effectRef idx="0">
+              <a:schemeClr val="accent1"/>
+            </a:effectRef>
+            <a:fontRef idx="minor">
+              <a:schemeClr val="lt1"/>
+            </a:fontRef>
+          </p:style>
+          <p:txBody>
+            <a:bodyPr rtlCol="0" anchor="ctr"/>
+            <a:lstStyle/>
+            <a:p>
+              <a:pPr algn="ctr"/>
+              <a:endParaRPr lang="en-US"/>
+            </a:p>
+          </p:txBody>
+        </p:sp>
+        <p:sp>
+          <p:nvSpPr>
+            <p:cNvPr id="16" name="TextBox 15"/>
+            <p:cNvSpPr txBox="1"/>
+            <p:nvPr/>
+          </p:nvSpPr>
+          <p:spPr>
+            <a:xfrm>
+              <a:off x="3352800" y="4114800"/>
+              <a:ext cx="1905000" cy="253916"/>
+            </a:xfrm>
+            <a:prstGeom prst="rect">
+              <a:avLst/>
+            </a:prstGeom>
+            <a:noFill/>
+            <a:ln w="25400">
+              <a:noFill/>
+            </a:ln>
+          </p:spPr>
+          <p:txBody>
+            <a:bodyPr wrap="square" rtlCol="0">
+              <a:spAutoFit/>
+            </a:bodyPr>
+            <a:lstStyle/>
+            <a:p>
+              <a:pPr algn="ctr"/>
+              <a:r>
+                <a:rPr lang="en-US" sz="1050" smtClean="0"/>
+                <a:t>HoopBase (Alternative)</a:t>
+              </a:r>
+              <a:endParaRPr lang="en-US" sz="1050"/>
+            </a:p>
+          </p:txBody>
+        </p:sp>
+        <p:sp>
+          <p:nvSpPr>
+            <p:cNvPr id="17" name="Rectangle 16"/>
+            <p:cNvSpPr/>
+            <p:nvPr/>
+          </p:nvSpPr>
+          <p:spPr>
+            <a:xfrm>
+              <a:off x="3352800" y="4114800"/>
+              <a:ext cx="1905000" cy="304800"/>
+            </a:xfrm>
+            <a:prstGeom prst="rect">
+              <a:avLst/>
+            </a:prstGeom>
+            <a:noFill/>
+            <a:ln>
+              <a:solidFill>
+                <a:schemeClr val="tx1"/>
+              </a:solidFill>
+            </a:ln>
+          </p:spPr>
+          <p:style>
+            <a:lnRef idx="2">
+              <a:schemeClr val="accent1">
+                <a:shade val="50000"/>
+              </a:schemeClr>
+            </a:lnRef>
+            <a:fillRef idx="1">
+              <a:schemeClr val="accent1"/>
+            </a:fillRef>
+            <a:effectRef idx="0">
+              <a:schemeClr val="accent1"/>
+            </a:effectRef>
+            <a:fontRef idx="minor">
+              <a:schemeClr val="lt1"/>
+            </a:fontRef>
+          </p:style>
+          <p:txBody>
+            <a:bodyPr rtlCol="0" anchor="ctr"/>
+            <a:lstStyle/>
+            <a:p>
+              <a:pPr algn="ctr"/>
+              <a:endParaRPr lang="en-US"/>
+            </a:p>
+          </p:txBody>
+        </p:sp>
+      </p:grpSp>
+      <p:grpSp>
+        <p:nvGrpSpPr>
+          <p:cNvPr id="24" name="Group 23"/>
+          <p:cNvGrpSpPr/>
+          <p:nvPr/>
+        </p:nvGrpSpPr>
+        <p:grpSpPr>
+          <a:xfrm>
+            <a:off x="3200400" y="3124200"/>
+            <a:ext cx="1905000" cy="1143000"/>
+            <a:chOff x="3352800" y="4114800"/>
+            <a:chExt cx="1905000" cy="1143000"/>
+          </a:xfrm>
+        </p:grpSpPr>
+        <p:sp>
+          <p:nvSpPr>
+            <p:cNvPr id="25" name="Rectangle 24"/>
+            <p:cNvSpPr/>
+            <p:nvPr/>
+          </p:nvSpPr>
+          <p:spPr>
+            <a:xfrm>
+              <a:off x="3352800" y="4114800"/>
+              <a:ext cx="1905000" cy="1143000"/>
+            </a:xfrm>
+            <a:prstGeom prst="rect">
+              <a:avLst/>
+            </a:prstGeom>
+            <a:solidFill>
+              <a:schemeClr val="bg1"/>
+            </a:solidFill>
+            <a:ln>
+              <a:solidFill>
+                <a:schemeClr val="tx1"/>
+              </a:solidFill>
+            </a:ln>
+          </p:spPr>
+          <p:style>
+            <a:lnRef idx="2">
+              <a:schemeClr val="accent1">
+                <a:shade val="50000"/>
+              </a:schemeClr>
+            </a:lnRef>
+            <a:fillRef idx="1">
+              <a:schemeClr val="accent1"/>
+            </a:fillRef>
+            <a:effectRef idx="0">
+              <a:schemeClr val="accent1"/>
+            </a:effectRef>
+            <a:fontRef idx="minor">
+              <a:schemeClr val="lt1"/>
+            </a:fontRef>
+          </p:style>
+          <p:txBody>
+            <a:bodyPr rtlCol="0" anchor="ctr"/>
+            <a:lstStyle/>
+            <a:p>
+              <a:pPr algn="ctr"/>
+              <a:endParaRPr lang="en-US" sz="1600"/>
+            </a:p>
+          </p:txBody>
+        </p:sp>
+        <p:sp>
+          <p:nvSpPr>
+            <p:cNvPr id="26" name="TextBox 25"/>
+            <p:cNvSpPr txBox="1"/>
+            <p:nvPr/>
+          </p:nvSpPr>
+          <p:spPr>
+            <a:xfrm>
+              <a:off x="3352800" y="4114800"/>
+              <a:ext cx="1905000" cy="253916"/>
+            </a:xfrm>
+            <a:prstGeom prst="rect">
+              <a:avLst/>
+            </a:prstGeom>
+            <a:noFill/>
+            <a:ln w="25400">
+              <a:noFill/>
+            </a:ln>
+          </p:spPr>
+          <p:txBody>
+            <a:bodyPr wrap="square" rtlCol="0">
+              <a:spAutoFit/>
+            </a:bodyPr>
+            <a:lstStyle/>
+            <a:p>
+              <a:pPr algn="ctr"/>
+              <a:r>
+                <a:rPr lang="en-US" sz="1050" smtClean="0"/>
+                <a:t>JTextAnnotator_ImplBase</a:t>
+              </a:r>
+              <a:endParaRPr lang="en-US" sz="1400"/>
+            </a:p>
+          </p:txBody>
+        </p:sp>
+        <p:sp>
+          <p:nvSpPr>
+            <p:cNvPr id="27" name="Rectangle 26"/>
+            <p:cNvSpPr/>
+            <p:nvPr/>
+          </p:nvSpPr>
+          <p:spPr>
+            <a:xfrm>
+              <a:off x="3352800" y="4114800"/>
+              <a:ext cx="1905000" cy="304800"/>
+            </a:xfrm>
+            <a:prstGeom prst="rect">
+              <a:avLst/>
+            </a:prstGeom>
+            <a:noFill/>
+            <a:ln>
+              <a:solidFill>
+                <a:schemeClr val="tx1"/>
+              </a:solidFill>
+            </a:ln>
+          </p:spPr>
+          <p:style>
+            <a:lnRef idx="2">
+              <a:schemeClr val="accent1">
+                <a:shade val="50000"/>
+              </a:schemeClr>
+            </a:lnRef>
+            <a:fillRef idx="1">
+              <a:schemeClr val="accent1"/>
+            </a:fillRef>
+            <a:effectRef idx="0">
+              <a:schemeClr val="accent1"/>
+            </a:effectRef>
+            <a:fontRef idx="minor">
+              <a:schemeClr val="lt1"/>
+            </a:fontRef>
+          </p:style>
+          <p:txBody>
+            <a:bodyPr rtlCol="0" anchor="ctr"/>
+            <a:lstStyle/>
+            <a:p>
+              <a:pPr algn="ctr"/>
+              <a:endParaRPr lang="en-US"/>
+            </a:p>
+          </p:txBody>
+        </p:sp>
+      </p:grpSp>
+      <p:cxnSp>
+        <p:nvCxnSpPr>
+          <p:cNvPr id="28" name="Straight Arrow Connector 27"/>
+          <p:cNvCxnSpPr>
+            <a:stCxn id="25" idx="2"/>
+            <a:endCxn id="17" idx="0"/>
+          </p:cNvCxnSpPr>
+          <p:nvPr/>
+        </p:nvCxnSpPr>
+        <p:spPr>
+          <a:xfrm>
+            <a:off x="4152900" y="4267200"/>
+            <a:ext cx="0" cy="762000"/>
+          </a:xfrm>
+          <a:prstGeom prst="straightConnector1">
+            <a:avLst/>
+          </a:prstGeom>
+          <a:ln w="12700">
+            <a:solidFill>
+              <a:schemeClr val="tx1"/>
+            </a:solidFill>
+            <a:tailEnd type="triangle" w="med" len="med"/>
+          </a:ln>
+        </p:spPr>
+        <p:style>
+          <a:lnRef idx="1">
+            <a:schemeClr val="accent1"/>
+          </a:lnRef>
+          <a:fillRef idx="0">
+            <a:schemeClr val="accent1"/>
+          </a:fillRef>
+          <a:effectRef idx="0">
+            <a:schemeClr val="accent1"/>
+          </a:effectRef>
+          <a:fontRef idx="minor">
+            <a:schemeClr val="tx1"/>
+          </a:fontRef>
+        </p:style>
+      </p:cxnSp>
+      <p:sp>
+        <p:nvSpPr>
+          <p:cNvPr id="34" name="TextBox 33"/>
+          <p:cNvSpPr txBox="1"/>
+          <p:nvPr/>
+        </p:nvSpPr>
+        <p:spPr>
+          <a:xfrm>
+            <a:off x="3429000" y="4495800"/>
+            <a:ext cx="646331" cy="261610"/>
+          </a:xfrm>
+          <a:prstGeom prst="rect">
+            <a:avLst/>
+          </a:prstGeom>
+          <a:noFill/>
+        </p:spPr>
+        <p:txBody>
+          <a:bodyPr wrap="none" rtlCol="0">
+            <a:spAutoFit/>
+          </a:bodyPr>
+          <a:lstStyle/>
+          <a:p>
+            <a:r>
+              <a:rPr lang="en-US" sz="1100" b="1" smtClean="0"/>
+              <a:t>extends</a:t>
+            </a:r>
+            <a:endParaRPr lang="en-US" sz="1100" b="1"/>
+          </a:p>
+        </p:txBody>
+      </p:sp>
+      <p:cxnSp>
+        <p:nvCxnSpPr>
+          <p:cNvPr id="39" name="Straight Connector 38"/>
+          <p:cNvCxnSpPr/>
+          <p:nvPr/>
+        </p:nvCxnSpPr>
+        <p:spPr>
+          <a:xfrm>
+            <a:off x="228600" y="4419600"/>
+            <a:ext cx="8763000" cy="0"/>
+          </a:xfrm>
+          <a:prstGeom prst="line">
+            <a:avLst/>
+          </a:prstGeom>
+          <a:ln>
+            <a:prstDash val="dash"/>
+          </a:ln>
+        </p:spPr>
+        <p:style>
+          <a:lnRef idx="1">
+            <a:schemeClr val="accent1"/>
+          </a:lnRef>
+          <a:fillRef idx="0">
+            <a:schemeClr val="accent1"/>
+          </a:fillRef>
+          <a:effectRef idx="0">
+            <a:schemeClr val="accent1"/>
+          </a:effectRef>
+          <a:fontRef idx="minor">
+            <a:schemeClr val="tx1"/>
+          </a:fontRef>
+        </p:style>
+      </p:cxnSp>
+      <p:sp>
+        <p:nvSpPr>
+          <p:cNvPr id="40" name="TextBox 39"/>
+          <p:cNvSpPr txBox="1"/>
+          <p:nvPr/>
+        </p:nvSpPr>
+        <p:spPr>
+          <a:xfrm>
+            <a:off x="228600" y="4081790"/>
+            <a:ext cx="971741" cy="261610"/>
+          </a:xfrm>
+          <a:prstGeom prst="rect">
+            <a:avLst/>
+          </a:prstGeom>
+          <a:noFill/>
+        </p:spPr>
+        <p:txBody>
+          <a:bodyPr wrap="none" rtlCol="0">
+            <a:spAutoFit/>
+          </a:bodyPr>
+          <a:lstStyle/>
+          <a:p>
+            <a:r>
+              <a:rPr lang="en-US" sz="1100" b="1" smtClean="0"/>
+              <a:t>UIMA </a:t>
+            </a:r>
+            <a:r>
+              <a:rPr lang="en-US" sz="1100" b="1" smtClean="0"/>
+              <a:t>Classes</a:t>
+            </a:r>
+            <a:endParaRPr lang="en-US" sz="1100" b="1"/>
+          </a:p>
+        </p:txBody>
+      </p:sp>
+      <p:cxnSp>
+        <p:nvCxnSpPr>
+          <p:cNvPr id="41" name="Straight Arrow Connector 40"/>
+          <p:cNvCxnSpPr/>
+          <p:nvPr/>
+        </p:nvCxnSpPr>
+        <p:spPr>
+          <a:xfrm>
+            <a:off x="1447800" y="4495800"/>
+            <a:ext cx="0" cy="304800"/>
+          </a:xfrm>
+          <a:prstGeom prst="straightConnector1">
+            <a:avLst/>
+          </a:prstGeom>
+          <a:ln w="12700">
+            <a:solidFill>
+              <a:schemeClr val="tx1"/>
+            </a:solidFill>
+            <a:tailEnd type="triangle" w="med" len="med"/>
+          </a:ln>
+        </p:spPr>
+        <p:style>
+          <a:lnRef idx="1">
+            <a:schemeClr val="accent1"/>
+          </a:lnRef>
+          <a:fillRef idx="0">
+            <a:schemeClr val="accent1"/>
+          </a:fillRef>
+          <a:effectRef idx="0">
+            <a:schemeClr val="accent1"/>
+          </a:effectRef>
+          <a:fontRef idx="minor">
+            <a:schemeClr val="tx1"/>
+          </a:fontRef>
+        </p:style>
+      </p:cxnSp>
+      <p:sp>
+        <p:nvSpPr>
+          <p:cNvPr id="42" name="TextBox 41"/>
+          <p:cNvSpPr txBox="1"/>
+          <p:nvPr/>
+        </p:nvSpPr>
+        <p:spPr>
+          <a:xfrm>
+            <a:off x="228600" y="4495800"/>
+            <a:ext cx="1253869" cy="261610"/>
+          </a:xfrm>
+          <a:prstGeom prst="rect">
+            <a:avLst/>
+          </a:prstGeom>
+          <a:noFill/>
+        </p:spPr>
+        <p:txBody>
+          <a:bodyPr wrap="none" rtlCol="0">
+            <a:spAutoFit/>
+          </a:bodyPr>
+          <a:lstStyle/>
+          <a:p>
+            <a:r>
+              <a:rPr lang="en-US" sz="1100" b="1" smtClean="0"/>
+              <a:t>Core Hoop Classes</a:t>
+            </a:r>
+            <a:endParaRPr lang="en-US" sz="1100" b="1"/>
+          </a:p>
+        </p:txBody>
+      </p:sp>
+      <p:cxnSp>
+        <p:nvCxnSpPr>
+          <p:cNvPr id="43" name="Straight Arrow Connector 42"/>
+          <p:cNvCxnSpPr/>
+          <p:nvPr/>
+        </p:nvCxnSpPr>
+        <p:spPr>
+          <a:xfrm flipV="1">
+            <a:off x="1447800" y="4038600"/>
+            <a:ext cx="0" cy="304800"/>
+          </a:xfrm>
+          <a:prstGeom prst="straightConnector1">
+            <a:avLst/>
+          </a:prstGeom>
+          <a:ln w="12700">
+            <a:solidFill>
+              <a:schemeClr val="tx1"/>
+            </a:solidFill>
+            <a:tailEnd type="triangle" w="med" len="med"/>
+          </a:ln>
+        </p:spPr>
+        <p:style>
+          <a:lnRef idx="1">
+            <a:schemeClr val="accent1"/>
+          </a:lnRef>
+          <a:fillRef idx="0">
+            <a:schemeClr val="accent1"/>
+          </a:fillRef>
+          <a:effectRef idx="0">
+            <a:schemeClr val="accent1"/>
+          </a:effectRef>
+          <a:fontRef idx="minor">
+            <a:schemeClr val="tx1"/>
+          </a:fontRef>
+        </p:style>
+      </p:cxnSp>
+      <p:grpSp>
+        <p:nvGrpSpPr>
+          <p:cNvPr id="45" name="Group 44"/>
+          <p:cNvGrpSpPr/>
+          <p:nvPr/>
+        </p:nvGrpSpPr>
+        <p:grpSpPr>
+          <a:xfrm>
+            <a:off x="3200400" y="1143000"/>
+            <a:ext cx="1905000" cy="1143000"/>
+            <a:chOff x="3352800" y="4114800"/>
+            <a:chExt cx="1905000" cy="1143000"/>
+          </a:xfrm>
+        </p:grpSpPr>
+        <p:sp>
+          <p:nvSpPr>
+            <p:cNvPr id="46" name="Rectangle 45"/>
+            <p:cNvSpPr/>
+            <p:nvPr/>
+          </p:nvSpPr>
+          <p:spPr>
+            <a:xfrm>
+              <a:off x="3352800" y="4114800"/>
+              <a:ext cx="1905000" cy="1143000"/>
+            </a:xfrm>
+            <a:prstGeom prst="rect">
+              <a:avLst/>
+            </a:prstGeom>
+            <a:solidFill>
+              <a:schemeClr val="bg1"/>
+            </a:solidFill>
+            <a:ln>
+              <a:solidFill>
+                <a:schemeClr val="tx1"/>
+              </a:solidFill>
+            </a:ln>
+          </p:spPr>
+          <p:style>
+            <a:lnRef idx="2">
+              <a:schemeClr val="accent1">
+                <a:shade val="50000"/>
+              </a:schemeClr>
+            </a:lnRef>
+            <a:fillRef idx="1">
+              <a:schemeClr val="accent1"/>
+            </a:fillRef>
+            <a:effectRef idx="0">
+              <a:schemeClr val="accent1"/>
+            </a:effectRef>
+            <a:fontRef idx="minor">
+              <a:schemeClr val="lt1"/>
+            </a:fontRef>
+          </p:style>
+          <p:txBody>
+            <a:bodyPr rtlCol="0" anchor="ctr"/>
+            <a:lstStyle/>
+            <a:p>
+              <a:pPr algn="ctr"/>
+              <a:endParaRPr lang="en-US" sz="1600"/>
+            </a:p>
+          </p:txBody>
+        </p:sp>
+        <p:sp>
+          <p:nvSpPr>
+            <p:cNvPr id="47" name="TextBox 46"/>
+            <p:cNvSpPr txBox="1"/>
+            <p:nvPr/>
+          </p:nvSpPr>
+          <p:spPr>
+            <a:xfrm>
+              <a:off x="3352800" y="4114800"/>
+              <a:ext cx="1905000" cy="253916"/>
+            </a:xfrm>
+            <a:prstGeom prst="rect">
+              <a:avLst/>
+            </a:prstGeom>
+            <a:noFill/>
+            <a:ln w="25400">
+              <a:noFill/>
+            </a:ln>
+          </p:spPr>
+          <p:txBody>
+            <a:bodyPr wrap="square" rtlCol="0">
+              <a:spAutoFit/>
+            </a:bodyPr>
+            <a:lstStyle/>
+            <a:p>
+              <a:pPr algn="ctr"/>
+              <a:r>
+                <a:rPr lang="en-US" sz="1050" smtClean="0"/>
+                <a:t>Annotator_ImplBase</a:t>
+              </a:r>
+              <a:endParaRPr lang="en-US" sz="1400"/>
+            </a:p>
+          </p:txBody>
+        </p:sp>
+        <p:sp>
+          <p:nvSpPr>
+            <p:cNvPr id="48" name="Rectangle 47"/>
+            <p:cNvSpPr/>
+            <p:nvPr/>
+          </p:nvSpPr>
+          <p:spPr>
+            <a:xfrm>
+              <a:off x="3352800" y="4114800"/>
+              <a:ext cx="1905000" cy="304800"/>
+            </a:xfrm>
+            <a:prstGeom prst="rect">
+              <a:avLst/>
+            </a:prstGeom>
+            <a:noFill/>
+            <a:ln>
+              <a:solidFill>
+                <a:schemeClr val="tx1"/>
+              </a:solidFill>
+            </a:ln>
+          </p:spPr>
+          <p:style>
+            <a:lnRef idx="2">
+              <a:schemeClr val="accent1">
+                <a:shade val="50000"/>
+              </a:schemeClr>
+            </a:lnRef>
+            <a:fillRef idx="1">
+              <a:schemeClr val="accent1"/>
+            </a:fillRef>
+            <a:effectRef idx="0">
+              <a:schemeClr val="accent1"/>
+            </a:effectRef>
+            <a:fontRef idx="minor">
+              <a:schemeClr val="lt1"/>
+            </a:fontRef>
+          </p:style>
+          <p:txBody>
+            <a:bodyPr rtlCol="0" anchor="ctr"/>
+            <a:lstStyle/>
+            <a:p>
+              <a:pPr algn="ctr"/>
+              <a:endParaRPr lang="en-US"/>
+            </a:p>
+          </p:txBody>
+        </p:sp>
+      </p:grpSp>
+      <p:grpSp>
+        <p:nvGrpSpPr>
+          <p:cNvPr id="49" name="Group 48"/>
+          <p:cNvGrpSpPr/>
+          <p:nvPr/>
+        </p:nvGrpSpPr>
+        <p:grpSpPr>
+          <a:xfrm>
+            <a:off x="5791200" y="1524000"/>
+            <a:ext cx="1905000" cy="1143000"/>
+            <a:chOff x="3352800" y="4114800"/>
+            <a:chExt cx="1905000" cy="1143000"/>
+          </a:xfrm>
+        </p:grpSpPr>
+        <p:sp>
+          <p:nvSpPr>
+            <p:cNvPr id="50" name="Rectangle 49"/>
+            <p:cNvSpPr/>
+            <p:nvPr/>
+          </p:nvSpPr>
+          <p:spPr>
+            <a:xfrm>
+              <a:off x="3352800" y="4114800"/>
+              <a:ext cx="1905000" cy="1143000"/>
+            </a:xfrm>
+            <a:prstGeom prst="rect">
+              <a:avLst/>
+            </a:prstGeom>
+            <a:solidFill>
+              <a:schemeClr val="bg1"/>
+            </a:solidFill>
+            <a:ln>
+              <a:solidFill>
+                <a:schemeClr val="tx1"/>
+              </a:solidFill>
+            </a:ln>
+          </p:spPr>
+          <p:style>
+            <a:lnRef idx="2">
+              <a:schemeClr val="accent1">
+                <a:shade val="50000"/>
+              </a:schemeClr>
+            </a:lnRef>
+            <a:fillRef idx="1">
+              <a:schemeClr val="accent1"/>
+            </a:fillRef>
+            <a:effectRef idx="0">
+              <a:schemeClr val="accent1"/>
+            </a:effectRef>
+            <a:fontRef idx="minor">
+              <a:schemeClr val="lt1"/>
+            </a:fontRef>
+          </p:style>
+          <p:txBody>
+            <a:bodyPr rtlCol="0" anchor="ctr"/>
+            <a:lstStyle/>
+            <a:p>
+              <a:pPr algn="ctr"/>
+              <a:endParaRPr lang="en-US" sz="1600"/>
+            </a:p>
+          </p:txBody>
+        </p:sp>
+        <p:sp>
+          <p:nvSpPr>
+            <p:cNvPr id="51" name="TextBox 50"/>
+            <p:cNvSpPr txBox="1"/>
+            <p:nvPr/>
+          </p:nvSpPr>
+          <p:spPr>
+            <a:xfrm>
+              <a:off x="3352800" y="4114800"/>
+              <a:ext cx="1905000" cy="253916"/>
+            </a:xfrm>
+            <a:prstGeom prst="rect">
+              <a:avLst/>
+            </a:prstGeom>
+            <a:noFill/>
+            <a:ln w="25400">
+              <a:noFill/>
+            </a:ln>
+          </p:spPr>
+          <p:txBody>
+            <a:bodyPr wrap="square" rtlCol="0">
+              <a:spAutoFit/>
+            </a:bodyPr>
+            <a:lstStyle/>
+            <a:p>
+              <a:pPr algn="ctr"/>
+              <a:r>
+                <a:rPr lang="en-US" sz="1050" smtClean="0"/>
+                <a:t>JTextAnnotator</a:t>
+              </a:r>
+              <a:endParaRPr lang="en-US" sz="1400"/>
+            </a:p>
+          </p:txBody>
+        </p:sp>
+        <p:sp>
+          <p:nvSpPr>
+            <p:cNvPr id="52" name="Rectangle 51"/>
+            <p:cNvSpPr/>
+            <p:nvPr/>
+          </p:nvSpPr>
+          <p:spPr>
+            <a:xfrm>
+              <a:off x="3352800" y="4114800"/>
+              <a:ext cx="1905000" cy="304800"/>
+            </a:xfrm>
+            <a:prstGeom prst="rect">
+              <a:avLst/>
+            </a:prstGeom>
+            <a:noFill/>
+            <a:ln>
+              <a:solidFill>
+                <a:schemeClr val="tx1"/>
+              </a:solidFill>
+            </a:ln>
+          </p:spPr>
+          <p:style>
+            <a:lnRef idx="2">
+              <a:schemeClr val="accent1">
+                <a:shade val="50000"/>
+              </a:schemeClr>
+            </a:lnRef>
+            <a:fillRef idx="1">
+              <a:schemeClr val="accent1"/>
+            </a:fillRef>
+            <a:effectRef idx="0">
+              <a:schemeClr val="accent1"/>
+            </a:effectRef>
+            <a:fontRef idx="minor">
+              <a:schemeClr val="lt1"/>
+            </a:fontRef>
+          </p:style>
+          <p:txBody>
+            <a:bodyPr rtlCol="0" anchor="ctr"/>
+            <a:lstStyle/>
+            <a:p>
+              <a:pPr algn="ctr"/>
+              <a:endParaRPr lang="en-US"/>
+            </a:p>
+          </p:txBody>
+        </p:sp>
+      </p:grpSp>
+      <p:cxnSp>
+        <p:nvCxnSpPr>
+          <p:cNvPr id="53" name="Straight Arrow Connector 52"/>
+          <p:cNvCxnSpPr>
+            <a:stCxn id="46" idx="2"/>
+            <a:endCxn id="27" idx="0"/>
+          </p:cNvCxnSpPr>
+          <p:nvPr/>
+        </p:nvCxnSpPr>
+        <p:spPr>
+          <a:xfrm>
+            <a:off x="4152900" y="2286000"/>
+            <a:ext cx="0" cy="838200"/>
+          </a:xfrm>
+          <a:prstGeom prst="straightConnector1">
+            <a:avLst/>
+          </a:prstGeom>
+          <a:ln w="12700">
+            <a:solidFill>
+              <a:schemeClr val="tx1"/>
+            </a:solidFill>
+            <a:tailEnd type="triangle" w="med" len="med"/>
+          </a:ln>
+        </p:spPr>
+        <p:style>
+          <a:lnRef idx="1">
+            <a:schemeClr val="accent1"/>
+          </a:lnRef>
+          <a:fillRef idx="0">
+            <a:schemeClr val="accent1"/>
+          </a:fillRef>
+          <a:effectRef idx="0">
+            <a:schemeClr val="accent1"/>
+          </a:effectRef>
+          <a:fontRef idx="minor">
+            <a:schemeClr val="tx1"/>
+          </a:fontRef>
+        </p:style>
+      </p:cxnSp>
+      <p:cxnSp>
+        <p:nvCxnSpPr>
+          <p:cNvPr id="54" name="Straight Arrow Connector 53"/>
+          <p:cNvCxnSpPr>
+            <a:stCxn id="50" idx="2"/>
+          </p:cNvCxnSpPr>
+          <p:nvPr/>
+        </p:nvCxnSpPr>
+        <p:spPr>
+          <a:xfrm flipH="1">
+            <a:off x="4724400" y="2667000"/>
+            <a:ext cx="2019300" cy="457200"/>
+          </a:xfrm>
+          <a:prstGeom prst="straightConnector1">
+            <a:avLst/>
+          </a:prstGeom>
+          <a:ln w="12700">
+            <a:solidFill>
+              <a:schemeClr val="tx1"/>
+            </a:solidFill>
+            <a:tailEnd type="triangle" w="med" len="med"/>
+          </a:ln>
+        </p:spPr>
+        <p:style>
+          <a:lnRef idx="1">
+            <a:schemeClr val="accent1"/>
+          </a:lnRef>
+          <a:fillRef idx="0">
+            <a:schemeClr val="accent1"/>
+          </a:fillRef>
+          <a:effectRef idx="0">
+            <a:schemeClr val="accent1"/>
+          </a:effectRef>
+          <a:fontRef idx="minor">
+            <a:schemeClr val="tx1"/>
+          </a:fontRef>
+        </p:style>
+      </p:cxnSp>
+      <p:sp>
+        <p:nvSpPr>
+          <p:cNvPr id="59" name="TextBox 58"/>
+          <p:cNvSpPr txBox="1"/>
+          <p:nvPr/>
+        </p:nvSpPr>
+        <p:spPr>
+          <a:xfrm>
+            <a:off x="3429000" y="2514600"/>
+            <a:ext cx="646331" cy="261610"/>
+          </a:xfrm>
+          <a:prstGeom prst="rect">
+            <a:avLst/>
+          </a:prstGeom>
+          <a:noFill/>
+        </p:spPr>
+        <p:txBody>
+          <a:bodyPr wrap="none" rtlCol="0">
+            <a:spAutoFit/>
+          </a:bodyPr>
+          <a:lstStyle/>
+          <a:p>
+            <a:r>
+              <a:rPr lang="en-US" sz="1100" b="1" smtClean="0"/>
+              <a:t>extends</a:t>
+            </a:r>
+            <a:endParaRPr lang="en-US" sz="1100" b="1"/>
+          </a:p>
+        </p:txBody>
+      </p:sp>
+      <p:sp>
+        <p:nvSpPr>
+          <p:cNvPr id="60" name="TextBox 59"/>
+          <p:cNvSpPr txBox="1"/>
+          <p:nvPr/>
+        </p:nvSpPr>
+        <p:spPr>
+          <a:xfrm>
+            <a:off x="5562600" y="2971800"/>
+            <a:ext cx="883575" cy="261610"/>
+          </a:xfrm>
+          <a:prstGeom prst="rect">
+            <a:avLst/>
+          </a:prstGeom>
+          <a:noFill/>
+        </p:spPr>
+        <p:txBody>
+          <a:bodyPr wrap="none" rtlCol="0">
+            <a:spAutoFit/>
+          </a:bodyPr>
+          <a:lstStyle/>
+          <a:p>
+            <a:r>
+              <a:rPr lang="en-US" sz="1100" b="1" smtClean="0"/>
+              <a:t>implements</a:t>
+            </a:r>
+            <a:endParaRPr lang="en-US" sz="1100" b="1"/>
+          </a:p>
+        </p:txBody>
+      </p:sp>
+    </p:spTree>
+  </p:cSld>
+  <p:clrMapOvr>
+    <a:masterClrMapping/>
+  </p:clrMapOvr>
+</p:sld>
+</file>
+
 <file path=ppt/slides/slide2.xml><?xml version="1.0" encoding="utf-8"?>
 <p:sld xmlns:a="http://schemas.openxmlformats.org/drawingml/2006/main" xmlns:r="http://schemas.openxmlformats.org/officeDocument/2006/relationships" xmlns:p="http://schemas.openxmlformats.org/presentationml/2006/main">
   <p:cSld>
@@ -9125,15 +10219,7 @@
           <a:p>
             <a:r>
               <a:rPr lang="en-US" smtClean="0"/>
-              <a:t>Hoop-UIMA compatibility is </a:t>
-            </a:r>
-            <a:r>
-              <a:rPr lang="en-US" smtClean="0"/>
-              <a:t>established </a:t>
-            </a:r>
-            <a:r>
-              <a:rPr lang="en-US" smtClean="0"/>
-              <a:t>by combining three distinct class systems from both architectures:</a:t>
+              <a:t>Hoop-UIMA compatibility is established by combining three distinct class systems from both architectures:</a:t>
             </a:r>
             <a:endParaRPr lang="en-US"/>
           </a:p>
@@ -9164,8 +10250,17 @@
             <a:pPr marL="342900" indent="-342900"/>
             <a:r>
               <a:rPr lang="en-US" smtClean="0"/>
-              <a:t>F1. Hoop/Analytic Interface</a:t>
-            </a:r>
+              <a:t>F1</a:t>
+            </a:r>
+            <a:r>
+              <a:rPr lang="en-US" smtClean="0"/>
+              <a:t>. </a:t>
+            </a:r>
+            <a:r>
+              <a:rPr lang="en-US" smtClean="0"/>
+              <a:t>Hoop/CAS Interface</a:t>
+            </a:r>
+            <a:endParaRPr lang="en-US" smtClean="0"/>
           </a:p>
           <a:p>
             <a:pPr marL="342900" indent="-342900"/>
@@ -9178,12 +10273,20 @@
             <a:pPr marL="342900" indent="-342900"/>
             <a:r>
               <a:rPr lang="en-US" smtClean="0"/>
-              <a:t>F3. UIMA/Hoop KV data type specification</a:t>
+              <a:t>F3. UIMA/Hoop KV data type </a:t>
+            </a:r>
+            <a:r>
+              <a:rPr lang="en-US" smtClean="0"/>
+              <a:t>specification</a:t>
             </a:r>
           </a:p>
           <a:p>
             <a:pPr marL="342900" indent="-342900"/>
-            <a:endParaRPr lang="en-US"/>
+            <a:r>
+              <a:rPr lang="en-US" smtClean="0"/>
+              <a:t>F4. Hoop/UIMA Analytic Interface</a:t>
+            </a:r>
+            <a:endParaRPr lang="en-US" smtClean="0"/>
           </a:p>
         </p:txBody>
       </p:sp>
@@ -10877,7 +11980,7 @@
         <p:spPr>
           <a:xfrm>
             <a:off x="533400" y="152400"/>
-            <a:ext cx="2417713" cy="369332"/>
+            <a:ext cx="2036648" cy="369332"/>
           </a:xfrm>
           <a:prstGeom prst="rect">
             <a:avLst/>
@@ -10891,7 +11994,7 @@
           <a:p>
             <a:r>
               <a:rPr lang="en-US" smtClean="0"/>
-              <a:t>Hoop/Analytic Interface</a:t>
+              <a:t>Hoop/CAS Interface</a:t>
             </a:r>
             <a:endParaRPr lang="en-US"/>
           </a:p>

</xml_diff>